<commit_message>
add more stopwords in EDA and rerun, edit powerpoint and improve Topic Modelling dominant topic draft
</commit_message>
<xml_diff>
--- a/Capstone_presentation_v1.0.pptx
+++ b/Capstone_presentation_v1.0.pptx
@@ -15633,7 +15633,7 @@
             </a:pPr>
             <a:r>
               <a:rPr lang="en-SG" dirty="0"/>
-              <a:t>Remove punctuation, escape characters, special characters including HTML markups, emojis, define extra </a:t>
+              <a:t>Remove punctuation, escape characters, special characters including HTML markups, emojis, remove duplicate contents, define extra </a:t>
             </a:r>
             <a:r>
               <a:rPr lang="en-SG" dirty="0" err="1"/>
@@ -17822,10 +17822,10 @@
       </p:pic>
       <p:pic>
         <p:nvPicPr>
-          <p:cNvPr id="4" name="Picture 3">
+          <p:cNvPr id="2" name="Picture 1">
             <a:extLst>
               <a:ext uri="{FF2B5EF4-FFF2-40B4-BE49-F238E27FC236}">
-                <a16:creationId xmlns:a16="http://schemas.microsoft.com/office/drawing/2014/main" id="{3822FF97-6EC7-B64F-808B-010237144A01}"/>
+                <a16:creationId xmlns:a16="http://schemas.microsoft.com/office/drawing/2014/main" id="{3B54D379-57A7-9A4D-8388-D00E21851F45}"/>
               </a:ext>
             </a:extLst>
           </p:cNvPr>
@@ -17842,8 +17842,8 @@
         </p:blipFill>
         <p:spPr>
           <a:xfrm>
-            <a:off x="991115" y="1704761"/>
-            <a:ext cx="4566405" cy="2350158"/>
+            <a:off x="1080506" y="1717040"/>
+            <a:ext cx="4267200" cy="2197100"/>
           </a:xfrm>
           <a:prstGeom prst="rect">
             <a:avLst/>
@@ -18257,10 +18257,10 @@
       </p:pic>
       <p:pic>
         <p:nvPicPr>
-          <p:cNvPr id="4" name="Picture 3">
+          <p:cNvPr id="2" name="Picture 1">
             <a:extLst>
               <a:ext uri="{FF2B5EF4-FFF2-40B4-BE49-F238E27FC236}">
-                <a16:creationId xmlns:a16="http://schemas.microsoft.com/office/drawing/2014/main" id="{A3271DEF-BFA2-C14D-85D8-BD5EAD771B55}"/>
+                <a16:creationId xmlns:a16="http://schemas.microsoft.com/office/drawing/2014/main" id="{13821C4C-423F-5A47-8112-E45BE653B7A7}"/>
               </a:ext>
             </a:extLst>
           </p:cNvPr>
@@ -18277,8 +18277,8 @@
         </p:blipFill>
         <p:spPr>
           <a:xfrm>
-            <a:off x="1092600" y="1701507"/>
-            <a:ext cx="4496639" cy="2235056"/>
+            <a:off x="1056376" y="1737360"/>
+            <a:ext cx="4356100" cy="2197100"/>
           </a:xfrm>
           <a:prstGeom prst="rect">
             <a:avLst/>
@@ -18614,36 +18614,6 @@
           </p:txBody>
         </p:sp>
       </p:grpSp>
-      <p:pic>
-        <p:nvPicPr>
-          <p:cNvPr id="6" name="Picture 5">
-            <a:extLst>
-              <a:ext uri="{FF2B5EF4-FFF2-40B4-BE49-F238E27FC236}">
-                <a16:creationId xmlns:a16="http://schemas.microsoft.com/office/drawing/2014/main" id="{D3A2FD2B-16EE-A24B-A2D3-E66BC06E0B7F}"/>
-              </a:ext>
-            </a:extLst>
-          </p:cNvPr>
-          <p:cNvPicPr>
-            <a:picLocks noChangeAspect="1"/>
-          </p:cNvPicPr>
-          <p:nvPr/>
-        </p:nvPicPr>
-        <p:blipFill>
-          <a:blip r:embed="rId3"/>
-          <a:stretch>
-            <a:fillRect/>
-          </a:stretch>
-        </p:blipFill>
-        <p:spPr>
-          <a:xfrm>
-            <a:off x="975360" y="1782358"/>
-            <a:ext cx="4979670" cy="2722332"/>
-          </a:xfrm>
-          <a:prstGeom prst="rect">
-            <a:avLst/>
-          </a:prstGeom>
-        </p:spPr>
-      </p:pic>
       <p:sp>
         <p:nvSpPr>
           <p:cNvPr id="13" name="Google Shape;363;p36">
@@ -18752,7 +18722,7 @@
           <p:nvPr/>
         </p:nvPicPr>
         <p:blipFill>
-          <a:blip r:embed="rId4">
+          <a:blip r:embed="rId3">
             <a:extLst>
               <a:ext uri="{28A0092B-C50C-407E-A947-70E740481C1C}">
                 <a14:useLocalDpi xmlns:a14="http://schemas.microsoft.com/office/drawing/2010/main" val="0"/>
@@ -18782,6 +18752,36 @@
               </a14:hiddenFill>
             </a:ext>
           </a:extLst>
+        </p:spPr>
+      </p:pic>
+      <p:pic>
+        <p:nvPicPr>
+          <p:cNvPr id="2" name="Picture 1">
+            <a:extLst>
+              <a:ext uri="{FF2B5EF4-FFF2-40B4-BE49-F238E27FC236}">
+                <a16:creationId xmlns:a16="http://schemas.microsoft.com/office/drawing/2014/main" id="{BC805702-AC32-BD45-8A63-0965EDA7AEB0}"/>
+              </a:ext>
+            </a:extLst>
+          </p:cNvPr>
+          <p:cNvPicPr>
+            <a:picLocks noChangeAspect="1"/>
+          </p:cNvPicPr>
+          <p:nvPr/>
+        </p:nvPicPr>
+        <p:blipFill>
+          <a:blip r:embed="rId4"/>
+          <a:stretch>
+            <a:fillRect/>
+          </a:stretch>
+        </p:blipFill>
+        <p:spPr>
+          <a:xfrm>
+            <a:off x="2321344" y="1793228"/>
+            <a:ext cx="3238500" cy="1739900"/>
+          </a:xfrm>
+          <a:prstGeom prst="rect">
+            <a:avLst/>
+          </a:prstGeom>
         </p:spPr>
       </p:pic>
     </p:spTree>
@@ -19113,36 +19113,6 @@
           </p:txBody>
         </p:sp>
       </p:grpSp>
-      <p:pic>
-        <p:nvPicPr>
-          <p:cNvPr id="2" name="Picture 1">
-            <a:extLst>
-              <a:ext uri="{FF2B5EF4-FFF2-40B4-BE49-F238E27FC236}">
-                <a16:creationId xmlns:a16="http://schemas.microsoft.com/office/drawing/2014/main" id="{B81B31E0-6A0C-2D4A-AAAE-87E7F24D4605}"/>
-              </a:ext>
-            </a:extLst>
-          </p:cNvPr>
-          <p:cNvPicPr>
-            <a:picLocks noChangeAspect="1"/>
-          </p:cNvPicPr>
-          <p:nvPr/>
-        </p:nvPicPr>
-        <p:blipFill>
-          <a:blip r:embed="rId3"/>
-          <a:stretch>
-            <a:fillRect/>
-          </a:stretch>
-        </p:blipFill>
-        <p:spPr>
-          <a:xfrm>
-            <a:off x="858648" y="1810580"/>
-            <a:ext cx="5109086" cy="2703310"/>
-          </a:xfrm>
-          <a:prstGeom prst="rect">
-            <a:avLst/>
-          </a:prstGeom>
-        </p:spPr>
-      </p:pic>
       <p:sp>
         <p:nvSpPr>
           <p:cNvPr id="9" name="Google Shape;363;p36">
@@ -19240,7 +19210,7 @@
           <p:nvPr/>
         </p:nvPicPr>
         <p:blipFill>
-          <a:blip r:embed="rId4">
+          <a:blip r:embed="rId3">
             <a:extLst>
               <a:ext uri="{28A0092B-C50C-407E-A947-70E740481C1C}">
                 <a14:useLocalDpi xmlns:a14="http://schemas.microsoft.com/office/drawing/2010/main" val="0"/>
@@ -19270,6 +19240,36 @@
               </a14:hiddenFill>
             </a:ext>
           </a:extLst>
+        </p:spPr>
+      </p:pic>
+      <p:pic>
+        <p:nvPicPr>
+          <p:cNvPr id="3" name="Picture 2">
+            <a:extLst>
+              <a:ext uri="{FF2B5EF4-FFF2-40B4-BE49-F238E27FC236}">
+                <a16:creationId xmlns:a16="http://schemas.microsoft.com/office/drawing/2014/main" id="{65DB76B7-DC39-AB47-946E-8CCD51C76E20}"/>
+              </a:ext>
+            </a:extLst>
+          </p:cNvPr>
+          <p:cNvPicPr>
+            <a:picLocks noChangeAspect="1"/>
+          </p:cNvPicPr>
+          <p:nvPr/>
+        </p:nvPicPr>
+        <p:blipFill>
+          <a:blip r:embed="rId4"/>
+          <a:stretch>
+            <a:fillRect/>
+          </a:stretch>
+        </p:blipFill>
+        <p:spPr>
+          <a:xfrm>
+            <a:off x="2555024" y="1786040"/>
+            <a:ext cx="3429000" cy="1765300"/>
+          </a:xfrm>
+          <a:prstGeom prst="rect">
+            <a:avLst/>
+          </a:prstGeom>
         </p:spPr>
       </p:pic>
     </p:spTree>
@@ -19603,10 +19603,10 @@
       </p:grpSp>
       <p:pic>
         <p:nvPicPr>
-          <p:cNvPr id="3" name="Picture 2">
+          <p:cNvPr id="2" name="Picture 1">
             <a:extLst>
               <a:ext uri="{FF2B5EF4-FFF2-40B4-BE49-F238E27FC236}">
-                <a16:creationId xmlns:a16="http://schemas.microsoft.com/office/drawing/2014/main" id="{46D4E42B-BAEE-1542-91E2-9303D1C24861}"/>
+                <a16:creationId xmlns:a16="http://schemas.microsoft.com/office/drawing/2014/main" id="{04A8AFA9-C4BD-B742-97EE-0D23120C9CCD}"/>
               </a:ext>
             </a:extLst>
           </p:cNvPr>
@@ -19623,8 +19623,8 @@
         </p:blipFill>
         <p:spPr>
           <a:xfrm>
-            <a:off x="856956" y="1626046"/>
-            <a:ext cx="5425440" cy="2868417"/>
+            <a:off x="856956" y="1712769"/>
+            <a:ext cx="5067300" cy="2717800"/>
           </a:xfrm>
           <a:prstGeom prst="rect">
             <a:avLst/>
@@ -23439,10 +23439,10 @@
       </p:grpSp>
       <p:pic>
         <p:nvPicPr>
-          <p:cNvPr id="2" name="Picture 1">
+          <p:cNvPr id="3" name="Picture 2">
             <a:extLst>
               <a:ext uri="{FF2B5EF4-FFF2-40B4-BE49-F238E27FC236}">
-                <a16:creationId xmlns:a16="http://schemas.microsoft.com/office/drawing/2014/main" id="{6F2006BD-F5B5-FC46-86C5-F9F6244EA671}"/>
+                <a16:creationId xmlns:a16="http://schemas.microsoft.com/office/drawing/2014/main" id="{0D4D85E3-18B5-B74F-A755-80FF1943EE91}"/>
               </a:ext>
             </a:extLst>
           </p:cNvPr>
@@ -23459,8 +23459,8 @@
         </p:blipFill>
         <p:spPr>
           <a:xfrm>
-            <a:off x="1054425" y="1614269"/>
-            <a:ext cx="5300764" cy="2445607"/>
+            <a:off x="856956" y="1738630"/>
+            <a:ext cx="5105400" cy="2336800"/>
           </a:xfrm>
           <a:prstGeom prst="rect">
             <a:avLst/>
@@ -23798,10 +23798,10 @@
       </p:grpSp>
       <p:pic>
         <p:nvPicPr>
-          <p:cNvPr id="3" name="Picture 2">
+          <p:cNvPr id="2" name="Picture 1">
             <a:extLst>
               <a:ext uri="{FF2B5EF4-FFF2-40B4-BE49-F238E27FC236}">
-                <a16:creationId xmlns:a16="http://schemas.microsoft.com/office/drawing/2014/main" id="{0E787587-A305-6548-A633-49D65D044DE3}"/>
+                <a16:creationId xmlns:a16="http://schemas.microsoft.com/office/drawing/2014/main" id="{6B3071C2-4BEE-3146-869D-B6A24A1EBD4E}"/>
               </a:ext>
             </a:extLst>
           </p:cNvPr>
@@ -23818,8 +23818,8 @@
         </p:blipFill>
         <p:spPr>
           <a:xfrm>
-            <a:off x="856956" y="1568132"/>
-            <a:ext cx="5405120" cy="2674699"/>
+            <a:off x="856956" y="1656080"/>
+            <a:ext cx="5156200" cy="2400300"/>
           </a:xfrm>
           <a:prstGeom prst="rect">
             <a:avLst/>
@@ -24157,10 +24157,10 @@
       </p:grpSp>
       <p:pic>
         <p:nvPicPr>
-          <p:cNvPr id="2" name="Picture 1">
+          <p:cNvPr id="3" name="Picture 2">
             <a:extLst>
               <a:ext uri="{FF2B5EF4-FFF2-40B4-BE49-F238E27FC236}">
-                <a16:creationId xmlns:a16="http://schemas.microsoft.com/office/drawing/2014/main" id="{D6B30BEA-4C9F-034E-B5E1-5F4448FE2DC8}"/>
+                <a16:creationId xmlns:a16="http://schemas.microsoft.com/office/drawing/2014/main" id="{48D24C6E-69C7-8448-B01B-AA83E1FECF5D}"/>
               </a:ext>
             </a:extLst>
           </p:cNvPr>
@@ -24177,8 +24177,8 @@
         </p:blipFill>
         <p:spPr>
           <a:xfrm>
-            <a:off x="875343" y="1613330"/>
-            <a:ext cx="3699244" cy="2990670"/>
+            <a:off x="789414" y="1477475"/>
+            <a:ext cx="4025900" cy="3314700"/>
           </a:xfrm>
           <a:prstGeom prst="rect">
             <a:avLst/>
@@ -24187,10 +24187,10 @@
       </p:pic>
       <p:pic>
         <p:nvPicPr>
-          <p:cNvPr id="4" name="Picture 3">
+          <p:cNvPr id="5" name="Picture 4">
             <a:extLst>
               <a:ext uri="{FF2B5EF4-FFF2-40B4-BE49-F238E27FC236}">
-                <a16:creationId xmlns:a16="http://schemas.microsoft.com/office/drawing/2014/main" id="{8EAF1A9F-2EEE-244D-86F2-4578591E0147}"/>
+                <a16:creationId xmlns:a16="http://schemas.microsoft.com/office/drawing/2014/main" id="{9A35054D-D540-AB44-8AB9-76480ACE3E70}"/>
               </a:ext>
             </a:extLst>
           </p:cNvPr>
@@ -24207,8 +24207,8 @@
         </p:blipFill>
         <p:spPr>
           <a:xfrm>
-            <a:off x="4672569" y="1623490"/>
-            <a:ext cx="3808955" cy="2738164"/>
+            <a:off x="4985618" y="1649269"/>
+            <a:ext cx="4013200" cy="2844800"/>
           </a:xfrm>
           <a:prstGeom prst="rect">
             <a:avLst/>

</xml_diff>

<commit_message>
edit slides base on feedback and EDA rough draft of boxplot salary range
</commit_message>
<xml_diff>
--- a/Capstone_presentation_v1.0.pptx
+++ b/Capstone_presentation_v1.0.pptx
@@ -5,7 +5,7 @@
     <p:sldMasterId id="2147483674" r:id="rId1"/>
   </p:sldMasterIdLst>
   <p:notesMasterIdLst>
-    <p:notesMasterId r:id="rId31"/>
+    <p:notesMasterId r:id="rId32"/>
   </p:notesMasterIdLst>
   <p:sldIdLst>
     <p:sldId id="256" r:id="rId2"/>
@@ -20,37 +20,38 @@
     <p:sldId id="312" r:id="rId11"/>
     <p:sldId id="313" r:id="rId12"/>
     <p:sldId id="304" r:id="rId13"/>
-    <p:sldId id="314" r:id="rId14"/>
-    <p:sldId id="305" r:id="rId15"/>
-    <p:sldId id="315" r:id="rId16"/>
-    <p:sldId id="316" r:id="rId17"/>
-    <p:sldId id="318" r:id="rId18"/>
-    <p:sldId id="319" r:id="rId19"/>
-    <p:sldId id="320" r:id="rId20"/>
-    <p:sldId id="321" r:id="rId21"/>
-    <p:sldId id="322" r:id="rId22"/>
-    <p:sldId id="323" r:id="rId23"/>
-    <p:sldId id="307" r:id="rId24"/>
-    <p:sldId id="308" r:id="rId25"/>
-    <p:sldId id="309" r:id="rId26"/>
-    <p:sldId id="310" r:id="rId27"/>
-    <p:sldId id="324" r:id="rId28"/>
-    <p:sldId id="325" r:id="rId29"/>
-    <p:sldId id="280" r:id="rId30"/>
+    <p:sldId id="326" r:id="rId14"/>
+    <p:sldId id="314" r:id="rId15"/>
+    <p:sldId id="305" r:id="rId16"/>
+    <p:sldId id="315" r:id="rId17"/>
+    <p:sldId id="316" r:id="rId18"/>
+    <p:sldId id="318" r:id="rId19"/>
+    <p:sldId id="319" r:id="rId20"/>
+    <p:sldId id="320" r:id="rId21"/>
+    <p:sldId id="321" r:id="rId22"/>
+    <p:sldId id="322" r:id="rId23"/>
+    <p:sldId id="323" r:id="rId24"/>
+    <p:sldId id="307" r:id="rId25"/>
+    <p:sldId id="308" r:id="rId26"/>
+    <p:sldId id="309" r:id="rId27"/>
+    <p:sldId id="310" r:id="rId28"/>
+    <p:sldId id="324" r:id="rId29"/>
+    <p:sldId id="325" r:id="rId30"/>
+    <p:sldId id="280" r:id="rId31"/>
   </p:sldIdLst>
   <p:sldSz cx="9144000" cy="5143500" type="screen16x9"/>
   <p:notesSz cx="6858000" cy="9144000"/>
   <p:embeddedFontLst>
     <p:embeddedFont>
       <p:font typeface="Lato" panose="020F0502020204030203" pitchFamily="34" charset="77"/>
-      <p:regular r:id="rId32"/>
-      <p:bold r:id="rId33"/>
-      <p:italic r:id="rId34"/>
-      <p:boldItalic r:id="rId35"/>
+      <p:regular r:id="rId33"/>
+      <p:bold r:id="rId34"/>
+      <p:italic r:id="rId35"/>
+      <p:boldItalic r:id="rId36"/>
     </p:embeddedFont>
     <p:embeddedFont>
       <p:font typeface="Pompiere" panose="02000000000000000000" pitchFamily="2" charset="77"/>
-      <p:regular r:id="rId36"/>
+      <p:regular r:id="rId37"/>
     </p:embeddedFont>
   </p:embeddedFontLst>
   <p:defaultTextStyle>
@@ -1261,6 +1262,115 @@
     </p:spTree>
     <p:extLst>
       <p:ext uri="{BB962C8B-B14F-4D97-AF65-F5344CB8AC3E}">
+        <p14:creationId xmlns:p14="http://schemas.microsoft.com/office/powerpoint/2010/main" val="2904711050"/>
+      </p:ext>
+    </p:extLst>
+  </p:cSld>
+  <p:clrMapOvr>
+    <a:masterClrMapping/>
+  </p:clrMapOvr>
+</p:notes>
+</file>
+
+<file path=ppt/notesSlides/notesSlide14.xml><?xml version="1.0" encoding="utf-8"?>
+<p:notes xmlns:a="http://schemas.openxmlformats.org/drawingml/2006/main" xmlns:r="http://schemas.openxmlformats.org/officeDocument/2006/relationships" xmlns:p="http://schemas.openxmlformats.org/presentationml/2006/main" showMasterSp="0" showMasterPhAnim="0">
+  <p:cSld>
+    <p:spTree>
+      <p:nvGrpSpPr>
+        <p:cNvPr id="1" name="Shape 356"/>
+        <p:cNvGrpSpPr/>
+        <p:nvPr/>
+      </p:nvGrpSpPr>
+      <p:grpSpPr>
+        <a:xfrm>
+          <a:off x="0" y="0"/>
+          <a:ext cx="0" cy="0"/>
+          <a:chOff x="0" y="0"/>
+          <a:chExt cx="0" cy="0"/>
+        </a:xfrm>
+      </p:grpSpPr>
+      <p:sp>
+        <p:nvSpPr>
+          <p:cNvPr id="357" name="Google Shape;357;g9d75e17901_0_210:notes"/>
+          <p:cNvSpPr>
+            <a:spLocks noGrp="1" noRot="1" noChangeAspect="1"/>
+          </p:cNvSpPr>
+          <p:nvPr>
+            <p:ph type="sldImg" idx="2"/>
+          </p:nvPr>
+        </p:nvSpPr>
+        <p:spPr>
+          <a:xfrm>
+            <a:off x="381000" y="685800"/>
+            <a:ext cx="6096000" cy="3429000"/>
+          </a:xfrm>
+          <a:custGeom>
+            <a:avLst/>
+            <a:gdLst/>
+            <a:ahLst/>
+            <a:cxnLst/>
+            <a:rect l="l" t="t" r="r" b="b"/>
+            <a:pathLst>
+              <a:path w="120000" h="120000" extrusionOk="0">
+                <a:moveTo>
+                  <a:pt x="0" y="0"/>
+                </a:moveTo>
+                <a:lnTo>
+                  <a:pt x="120000" y="0"/>
+                </a:lnTo>
+                <a:lnTo>
+                  <a:pt x="120000" y="120000"/>
+                </a:lnTo>
+                <a:lnTo>
+                  <a:pt x="0" y="120000"/>
+                </a:lnTo>
+                <a:close/>
+              </a:path>
+            </a:pathLst>
+          </a:custGeom>
+        </p:spPr>
+      </p:sp>
+      <p:sp>
+        <p:nvSpPr>
+          <p:cNvPr id="358" name="Google Shape;358;g9d75e17901_0_210:notes"/>
+          <p:cNvSpPr txBox="1">
+            <a:spLocks noGrp="1"/>
+          </p:cNvSpPr>
+          <p:nvPr>
+            <p:ph type="body" idx="1"/>
+          </p:nvPr>
+        </p:nvSpPr>
+        <p:spPr>
+          <a:xfrm>
+            <a:off x="685800" y="4343400"/>
+            <a:ext cx="5486400" cy="4114800"/>
+          </a:xfrm>
+          <a:prstGeom prst="rect">
+            <a:avLst/>
+          </a:prstGeom>
+        </p:spPr>
+        <p:txBody>
+          <a:bodyPr spcFirstLastPara="1" wrap="square" lIns="91425" tIns="91425" rIns="91425" bIns="91425" anchor="t" anchorCtr="0">
+            <a:noAutofit/>
+          </a:bodyPr>
+          <a:lstStyle/>
+          <a:p>
+            <a:pPr marL="0" lvl="0" indent="0" algn="l" rtl="0">
+              <a:spcBef>
+                <a:spcPts val="0"/>
+              </a:spcBef>
+              <a:spcAft>
+                <a:spcPts val="0"/>
+              </a:spcAft>
+              <a:buNone/>
+            </a:pPr>
+            <a:endParaRPr/>
+          </a:p>
+        </p:txBody>
+      </p:sp>
+    </p:spTree>
+    <p:extLst>
+      <p:ext uri="{BB962C8B-B14F-4D97-AF65-F5344CB8AC3E}">
         <p14:creationId xmlns:p14="http://schemas.microsoft.com/office/powerpoint/2010/main" val="437147897"/>
       </p:ext>
     </p:extLst>
@@ -1271,7 +1381,7 @@
 </p:notes>
 </file>
 
-<file path=ppt/notesSlides/notesSlide14.xml><?xml version="1.0" encoding="utf-8"?>
+<file path=ppt/notesSlides/notesSlide15.xml><?xml version="1.0" encoding="utf-8"?>
 <p:notes xmlns:a="http://schemas.openxmlformats.org/drawingml/2006/main" xmlns:r="http://schemas.openxmlformats.org/officeDocument/2006/relationships" xmlns:p="http://schemas.openxmlformats.org/presentationml/2006/main" showMasterSp="0" showMasterPhAnim="0">
   <p:cSld>
     <p:spTree>
@@ -1371,115 +1481,6 @@
     <p:extLst>
       <p:ext uri="{BB962C8B-B14F-4D97-AF65-F5344CB8AC3E}">
         <p14:creationId xmlns:p14="http://schemas.microsoft.com/office/powerpoint/2010/main" val="2517750361"/>
-      </p:ext>
-    </p:extLst>
-  </p:cSld>
-  <p:clrMapOvr>
-    <a:masterClrMapping/>
-  </p:clrMapOvr>
-</p:notes>
-</file>
-
-<file path=ppt/notesSlides/notesSlide15.xml><?xml version="1.0" encoding="utf-8"?>
-<p:notes xmlns:a="http://schemas.openxmlformats.org/drawingml/2006/main" xmlns:r="http://schemas.openxmlformats.org/officeDocument/2006/relationships" xmlns:p="http://schemas.openxmlformats.org/presentationml/2006/main" showMasterSp="0" showMasterPhAnim="0">
-  <p:cSld>
-    <p:spTree>
-      <p:nvGrpSpPr>
-        <p:cNvPr id="1" name="Shape 356"/>
-        <p:cNvGrpSpPr/>
-        <p:nvPr/>
-      </p:nvGrpSpPr>
-      <p:grpSpPr>
-        <a:xfrm>
-          <a:off x="0" y="0"/>
-          <a:ext cx="0" cy="0"/>
-          <a:chOff x="0" y="0"/>
-          <a:chExt cx="0" cy="0"/>
-        </a:xfrm>
-      </p:grpSpPr>
-      <p:sp>
-        <p:nvSpPr>
-          <p:cNvPr id="357" name="Google Shape;357;g9d75e17901_0_210:notes"/>
-          <p:cNvSpPr>
-            <a:spLocks noGrp="1" noRot="1" noChangeAspect="1"/>
-          </p:cNvSpPr>
-          <p:nvPr>
-            <p:ph type="sldImg" idx="2"/>
-          </p:nvPr>
-        </p:nvSpPr>
-        <p:spPr>
-          <a:xfrm>
-            <a:off x="381000" y="685800"/>
-            <a:ext cx="6096000" cy="3429000"/>
-          </a:xfrm>
-          <a:custGeom>
-            <a:avLst/>
-            <a:gdLst/>
-            <a:ahLst/>
-            <a:cxnLst/>
-            <a:rect l="l" t="t" r="r" b="b"/>
-            <a:pathLst>
-              <a:path w="120000" h="120000" extrusionOk="0">
-                <a:moveTo>
-                  <a:pt x="0" y="0"/>
-                </a:moveTo>
-                <a:lnTo>
-                  <a:pt x="120000" y="0"/>
-                </a:lnTo>
-                <a:lnTo>
-                  <a:pt x="120000" y="120000"/>
-                </a:lnTo>
-                <a:lnTo>
-                  <a:pt x="0" y="120000"/>
-                </a:lnTo>
-                <a:close/>
-              </a:path>
-            </a:pathLst>
-          </a:custGeom>
-        </p:spPr>
-      </p:sp>
-      <p:sp>
-        <p:nvSpPr>
-          <p:cNvPr id="358" name="Google Shape;358;g9d75e17901_0_210:notes"/>
-          <p:cNvSpPr txBox="1">
-            <a:spLocks noGrp="1"/>
-          </p:cNvSpPr>
-          <p:nvPr>
-            <p:ph type="body" idx="1"/>
-          </p:nvPr>
-        </p:nvSpPr>
-        <p:spPr>
-          <a:xfrm>
-            <a:off x="685800" y="4343400"/>
-            <a:ext cx="5486400" cy="4114800"/>
-          </a:xfrm>
-          <a:prstGeom prst="rect">
-            <a:avLst/>
-          </a:prstGeom>
-        </p:spPr>
-        <p:txBody>
-          <a:bodyPr spcFirstLastPara="1" wrap="square" lIns="91425" tIns="91425" rIns="91425" bIns="91425" anchor="t" anchorCtr="0">
-            <a:noAutofit/>
-          </a:bodyPr>
-          <a:lstStyle/>
-          <a:p>
-            <a:pPr marL="0" lvl="0" indent="0" algn="l" rtl="0">
-              <a:spcBef>
-                <a:spcPts val="0"/>
-              </a:spcBef>
-              <a:spcAft>
-                <a:spcPts val="0"/>
-              </a:spcAft>
-              <a:buNone/>
-            </a:pPr>
-            <a:endParaRPr/>
-          </a:p>
-        </p:txBody>
-      </p:sp>
-    </p:spTree>
-    <p:extLst>
-      <p:ext uri="{BB962C8B-B14F-4D97-AF65-F5344CB8AC3E}">
-        <p14:creationId xmlns:p14="http://schemas.microsoft.com/office/powerpoint/2010/main" val="821898419"/>
       </p:ext>
     </p:extLst>
   </p:cSld>
@@ -1588,7 +1589,7 @@
     </p:spTree>
     <p:extLst>
       <p:ext uri="{BB962C8B-B14F-4D97-AF65-F5344CB8AC3E}">
-        <p14:creationId xmlns:p14="http://schemas.microsoft.com/office/powerpoint/2010/main" val="3355587453"/>
+        <p14:creationId xmlns:p14="http://schemas.microsoft.com/office/powerpoint/2010/main" val="821898419"/>
       </p:ext>
     </p:extLst>
   </p:cSld>
@@ -1697,7 +1698,7 @@
     </p:spTree>
     <p:extLst>
       <p:ext uri="{BB962C8B-B14F-4D97-AF65-F5344CB8AC3E}">
-        <p14:creationId xmlns:p14="http://schemas.microsoft.com/office/powerpoint/2010/main" val="1681583449"/>
+        <p14:creationId xmlns:p14="http://schemas.microsoft.com/office/powerpoint/2010/main" val="3355587453"/>
       </p:ext>
     </p:extLst>
   </p:cSld>
@@ -1806,7 +1807,7 @@
     </p:spTree>
     <p:extLst>
       <p:ext uri="{BB962C8B-B14F-4D97-AF65-F5344CB8AC3E}">
-        <p14:creationId xmlns:p14="http://schemas.microsoft.com/office/powerpoint/2010/main" val="2379271968"/>
+        <p14:creationId xmlns:p14="http://schemas.microsoft.com/office/powerpoint/2010/main" val="1681583449"/>
       </p:ext>
     </p:extLst>
   </p:cSld>
@@ -1915,7 +1916,7 @@
     </p:spTree>
     <p:extLst>
       <p:ext uri="{BB962C8B-B14F-4D97-AF65-F5344CB8AC3E}">
-        <p14:creationId xmlns:p14="http://schemas.microsoft.com/office/powerpoint/2010/main" val="543257590"/>
+        <p14:creationId xmlns:p14="http://schemas.microsoft.com/office/powerpoint/2010/main" val="2379271968"/>
       </p:ext>
     </p:extLst>
   </p:cSld>
@@ -2128,7 +2129,7 @@
     </p:spTree>
     <p:extLst>
       <p:ext uri="{BB962C8B-B14F-4D97-AF65-F5344CB8AC3E}">
-        <p14:creationId xmlns:p14="http://schemas.microsoft.com/office/powerpoint/2010/main" val="4084959681"/>
+        <p14:creationId xmlns:p14="http://schemas.microsoft.com/office/powerpoint/2010/main" val="543257590"/>
       </p:ext>
     </p:extLst>
   </p:cSld>
@@ -2237,7 +2238,7 @@
     </p:spTree>
     <p:extLst>
       <p:ext uri="{BB962C8B-B14F-4D97-AF65-F5344CB8AC3E}">
-        <p14:creationId xmlns:p14="http://schemas.microsoft.com/office/powerpoint/2010/main" val="2097358827"/>
+        <p14:creationId xmlns:p14="http://schemas.microsoft.com/office/powerpoint/2010/main" val="4084959681"/>
       </p:ext>
     </p:extLst>
   </p:cSld>
@@ -2339,6 +2340,123 @@
               </a:spcAft>
               <a:buNone/>
             </a:pPr>
+            <a:endParaRPr/>
+          </a:p>
+        </p:txBody>
+      </p:sp>
+    </p:spTree>
+    <p:extLst>
+      <p:ext uri="{BB962C8B-B14F-4D97-AF65-F5344CB8AC3E}">
+        <p14:creationId xmlns:p14="http://schemas.microsoft.com/office/powerpoint/2010/main" val="2097358827"/>
+      </p:ext>
+    </p:extLst>
+  </p:cSld>
+  <p:clrMapOvr>
+    <a:masterClrMapping/>
+  </p:clrMapOvr>
+</p:notes>
+</file>
+
+<file path=ppt/notesSlides/notesSlide23.xml><?xml version="1.0" encoding="utf-8"?>
+<p:notes xmlns:a="http://schemas.openxmlformats.org/drawingml/2006/main" xmlns:r="http://schemas.openxmlformats.org/officeDocument/2006/relationships" xmlns:p="http://schemas.openxmlformats.org/presentationml/2006/main" showMasterSp="0" showMasterPhAnim="0">
+  <p:cSld>
+    <p:spTree>
+      <p:nvGrpSpPr>
+        <p:cNvPr id="1" name="Shape 356"/>
+        <p:cNvGrpSpPr/>
+        <p:nvPr/>
+      </p:nvGrpSpPr>
+      <p:grpSpPr>
+        <a:xfrm>
+          <a:off x="0" y="0"/>
+          <a:ext cx="0" cy="0"/>
+          <a:chOff x="0" y="0"/>
+          <a:chExt cx="0" cy="0"/>
+        </a:xfrm>
+      </p:grpSpPr>
+      <p:sp>
+        <p:nvSpPr>
+          <p:cNvPr id="357" name="Google Shape;357;g9d75e17901_0_210:notes"/>
+          <p:cNvSpPr>
+            <a:spLocks noGrp="1" noRot="1" noChangeAspect="1"/>
+          </p:cNvSpPr>
+          <p:nvPr>
+            <p:ph type="sldImg" idx="2"/>
+          </p:nvPr>
+        </p:nvSpPr>
+        <p:spPr>
+          <a:xfrm>
+            <a:off x="381000" y="685800"/>
+            <a:ext cx="6096000" cy="3429000"/>
+          </a:xfrm>
+          <a:custGeom>
+            <a:avLst/>
+            <a:gdLst/>
+            <a:ahLst/>
+            <a:cxnLst/>
+            <a:rect l="l" t="t" r="r" b="b"/>
+            <a:pathLst>
+              <a:path w="120000" h="120000" extrusionOk="0">
+                <a:moveTo>
+                  <a:pt x="0" y="0"/>
+                </a:moveTo>
+                <a:lnTo>
+                  <a:pt x="120000" y="0"/>
+                </a:lnTo>
+                <a:lnTo>
+                  <a:pt x="120000" y="120000"/>
+                </a:lnTo>
+                <a:lnTo>
+                  <a:pt x="0" y="120000"/>
+                </a:lnTo>
+                <a:close/>
+              </a:path>
+            </a:pathLst>
+          </a:custGeom>
+        </p:spPr>
+      </p:sp>
+      <p:sp>
+        <p:nvSpPr>
+          <p:cNvPr id="358" name="Google Shape;358;g9d75e17901_0_210:notes"/>
+          <p:cNvSpPr txBox="1">
+            <a:spLocks noGrp="1"/>
+          </p:cNvSpPr>
+          <p:nvPr>
+            <p:ph type="body" idx="1"/>
+          </p:nvPr>
+        </p:nvSpPr>
+        <p:spPr>
+          <a:xfrm>
+            <a:off x="685800" y="4343400"/>
+            <a:ext cx="5486400" cy="4114800"/>
+          </a:xfrm>
+          <a:prstGeom prst="rect">
+            <a:avLst/>
+          </a:prstGeom>
+        </p:spPr>
+        <p:txBody>
+          <a:bodyPr spcFirstLastPara="1" wrap="square" lIns="91425" tIns="91425" rIns="91425" bIns="91425" anchor="t" anchorCtr="0">
+            <a:noAutofit/>
+          </a:bodyPr>
+          <a:lstStyle/>
+          <a:p>
+            <a:pPr marL="0" lvl="0" indent="0" algn="l" rtl="0">
+              <a:spcBef>
+                <a:spcPts val="0"/>
+              </a:spcBef>
+              <a:spcAft>
+                <a:spcPts val="0"/>
+              </a:spcAft>
+              <a:buNone/>
+            </a:pPr>
+            <a:r>
+              <a:rPr lang="en-US" dirty="0"/>
+              <a:t>Change </a:t>
+            </a:r>
+            <a:r>
+              <a:rPr lang="en-US"/>
+              <a:t>to boxplot</a:t>
+            </a:r>
             <a:endParaRPr dirty="0"/>
           </a:p>
         </p:txBody>
@@ -2356,7 +2474,7 @@
 </p:notes>
 </file>
 
-<file path=ppt/notesSlides/notesSlide23.xml><?xml version="1.0" encoding="utf-8"?>
+<file path=ppt/notesSlides/notesSlide24.xml><?xml version="1.0" encoding="utf-8"?>
 <p:notes xmlns:a="http://schemas.openxmlformats.org/drawingml/2006/main" xmlns:r="http://schemas.openxmlformats.org/officeDocument/2006/relationships" xmlns:p="http://schemas.openxmlformats.org/presentationml/2006/main" showMasterSp="0" showMasterPhAnim="0">
   <p:cSld>
     <p:spTree>
@@ -2465,7 +2583,7 @@
 </p:notes>
 </file>
 
-<file path=ppt/notesSlides/notesSlide24.xml><?xml version="1.0" encoding="utf-8"?>
+<file path=ppt/notesSlides/notesSlide25.xml><?xml version="1.0" encoding="utf-8"?>
 <p:notes xmlns:a="http://schemas.openxmlformats.org/drawingml/2006/main" xmlns:r="http://schemas.openxmlformats.org/officeDocument/2006/relationships" xmlns:p="http://schemas.openxmlformats.org/presentationml/2006/main" showMasterSp="0" showMasterPhAnim="0">
   <p:cSld>
     <p:spTree>
@@ -2574,7 +2692,7 @@
 </p:notes>
 </file>
 
-<file path=ppt/notesSlides/notesSlide25.xml><?xml version="1.0" encoding="utf-8"?>
+<file path=ppt/notesSlides/notesSlide26.xml><?xml version="1.0" encoding="utf-8"?>
 <p:notes xmlns:a="http://schemas.openxmlformats.org/drawingml/2006/main" xmlns:r="http://schemas.openxmlformats.org/officeDocument/2006/relationships" xmlns:p="http://schemas.openxmlformats.org/presentationml/2006/main" showMasterSp="0" showMasterPhAnim="0">
   <p:cSld>
     <p:spTree>
@@ -2683,7 +2801,7 @@
 </p:notes>
 </file>
 
-<file path=ppt/notesSlides/notesSlide26.xml><?xml version="1.0" encoding="utf-8"?>
+<file path=ppt/notesSlides/notesSlide27.xml><?xml version="1.0" encoding="utf-8"?>
 <p:notes xmlns:a="http://schemas.openxmlformats.org/drawingml/2006/main" xmlns:r="http://schemas.openxmlformats.org/officeDocument/2006/relationships" xmlns:p="http://schemas.openxmlformats.org/presentationml/2006/main" showMasterSp="0" showMasterPhAnim="0">
   <p:cSld>
     <p:spTree>
@@ -2792,7 +2910,7 @@
 </p:notes>
 </file>
 
-<file path=ppt/notesSlides/notesSlide27.xml><?xml version="1.0" encoding="utf-8"?>
+<file path=ppt/notesSlides/notesSlide28.xml><?xml version="1.0" encoding="utf-8"?>
 <p:notes xmlns:a="http://schemas.openxmlformats.org/drawingml/2006/main" xmlns:r="http://schemas.openxmlformats.org/officeDocument/2006/relationships" xmlns:p="http://schemas.openxmlformats.org/presentationml/2006/main" showMasterSp="0" showMasterPhAnim="0">
   <p:cSld>
     <p:spTree>
@@ -2901,7 +3019,7 @@
 </p:notes>
 </file>
 
-<file path=ppt/notesSlides/notesSlide28.xml><?xml version="1.0" encoding="utf-8"?>
+<file path=ppt/notesSlides/notesSlide29.xml><?xml version="1.0" encoding="utf-8"?>
 <p:notes xmlns:a="http://schemas.openxmlformats.org/drawingml/2006/main" xmlns:r="http://schemas.openxmlformats.org/officeDocument/2006/relationships" xmlns:p="http://schemas.openxmlformats.org/presentationml/2006/main" showMasterSp="0" showMasterPhAnim="0">
   <p:cSld>
     <p:spTree>
@@ -3010,110 +3128,6 @@
 </p:notes>
 </file>
 
-<file path=ppt/notesSlides/notesSlide29.xml><?xml version="1.0" encoding="utf-8"?>
-<p:notes xmlns:a="http://schemas.openxmlformats.org/drawingml/2006/main" xmlns:r="http://schemas.openxmlformats.org/officeDocument/2006/relationships" xmlns:p="http://schemas.openxmlformats.org/presentationml/2006/main" showMasterSp="0" showMasterPhAnim="0">
-  <p:cSld>
-    <p:spTree>
-      <p:nvGrpSpPr>
-        <p:cNvPr id="1" name="Shape 832"/>
-        <p:cNvGrpSpPr/>
-        <p:nvPr/>
-      </p:nvGrpSpPr>
-      <p:grpSpPr>
-        <a:xfrm>
-          <a:off x="0" y="0"/>
-          <a:ext cx="0" cy="0"/>
-          <a:chOff x="0" y="0"/>
-          <a:chExt cx="0" cy="0"/>
-        </a:xfrm>
-      </p:grpSpPr>
-      <p:sp>
-        <p:nvSpPr>
-          <p:cNvPr id="833" name="Google Shape;833;g9d75e17901_0_81:notes"/>
-          <p:cNvSpPr>
-            <a:spLocks noGrp="1" noRot="1" noChangeAspect="1"/>
-          </p:cNvSpPr>
-          <p:nvPr>
-            <p:ph type="sldImg" idx="2"/>
-          </p:nvPr>
-        </p:nvSpPr>
-        <p:spPr>
-          <a:xfrm>
-            <a:off x="381000" y="685800"/>
-            <a:ext cx="6096000" cy="3429000"/>
-          </a:xfrm>
-          <a:custGeom>
-            <a:avLst/>
-            <a:gdLst/>
-            <a:ahLst/>
-            <a:cxnLst/>
-            <a:rect l="l" t="t" r="r" b="b"/>
-            <a:pathLst>
-              <a:path w="120000" h="120000" extrusionOk="0">
-                <a:moveTo>
-                  <a:pt x="0" y="0"/>
-                </a:moveTo>
-                <a:lnTo>
-                  <a:pt x="120000" y="0"/>
-                </a:lnTo>
-                <a:lnTo>
-                  <a:pt x="120000" y="120000"/>
-                </a:lnTo>
-                <a:lnTo>
-                  <a:pt x="0" y="120000"/>
-                </a:lnTo>
-                <a:close/>
-              </a:path>
-            </a:pathLst>
-          </a:custGeom>
-        </p:spPr>
-      </p:sp>
-      <p:sp>
-        <p:nvSpPr>
-          <p:cNvPr id="834" name="Google Shape;834;g9d75e17901_0_81:notes"/>
-          <p:cNvSpPr txBox="1">
-            <a:spLocks noGrp="1"/>
-          </p:cNvSpPr>
-          <p:nvPr>
-            <p:ph type="body" idx="1"/>
-          </p:nvPr>
-        </p:nvSpPr>
-        <p:spPr>
-          <a:xfrm>
-            <a:off x="685800" y="4343400"/>
-            <a:ext cx="5486400" cy="4114800"/>
-          </a:xfrm>
-          <a:prstGeom prst="rect">
-            <a:avLst/>
-          </a:prstGeom>
-        </p:spPr>
-        <p:txBody>
-          <a:bodyPr spcFirstLastPara="1" wrap="square" lIns="91425" tIns="91425" rIns="91425" bIns="91425" anchor="t" anchorCtr="0">
-            <a:noAutofit/>
-          </a:bodyPr>
-          <a:lstStyle/>
-          <a:p>
-            <a:pPr marL="0" lvl="0" indent="0" algn="l" rtl="0">
-              <a:spcBef>
-                <a:spcPts val="0"/>
-              </a:spcBef>
-              <a:spcAft>
-                <a:spcPts val="0"/>
-              </a:spcAft>
-              <a:buNone/>
-            </a:pPr>
-            <a:endParaRPr/>
-          </a:p>
-        </p:txBody>
-      </p:sp>
-    </p:spTree>
-  </p:cSld>
-  <p:clrMapOvr>
-    <a:masterClrMapping/>
-  </p:clrMapOvr>
-</p:notes>
-</file>
-
 <file path=ppt/notesSlides/notesSlide3.xml><?xml version="1.0" encoding="utf-8"?>
 <p:notes xmlns:a="http://schemas.openxmlformats.org/drawingml/2006/main" xmlns:r="http://schemas.openxmlformats.org/officeDocument/2006/relationships" xmlns:p="http://schemas.openxmlformats.org/presentationml/2006/main" showMasterSp="0" showMasterPhAnim="0">
   <p:cSld>
@@ -3175,6 +3189,110 @@
       <p:sp>
         <p:nvSpPr>
           <p:cNvPr id="329" name="Google Shape;329;ga41cc00f87_2_22:notes"/>
+          <p:cNvSpPr txBox="1">
+            <a:spLocks noGrp="1"/>
+          </p:cNvSpPr>
+          <p:nvPr>
+            <p:ph type="body" idx="1"/>
+          </p:nvPr>
+        </p:nvSpPr>
+        <p:spPr>
+          <a:xfrm>
+            <a:off x="685800" y="4343400"/>
+            <a:ext cx="5486400" cy="4114800"/>
+          </a:xfrm>
+          <a:prstGeom prst="rect">
+            <a:avLst/>
+          </a:prstGeom>
+        </p:spPr>
+        <p:txBody>
+          <a:bodyPr spcFirstLastPara="1" wrap="square" lIns="91425" tIns="91425" rIns="91425" bIns="91425" anchor="t" anchorCtr="0">
+            <a:noAutofit/>
+          </a:bodyPr>
+          <a:lstStyle/>
+          <a:p>
+            <a:pPr marL="0" lvl="0" indent="0" algn="l" rtl="0">
+              <a:spcBef>
+                <a:spcPts val="0"/>
+              </a:spcBef>
+              <a:spcAft>
+                <a:spcPts val="0"/>
+              </a:spcAft>
+              <a:buNone/>
+            </a:pPr>
+            <a:endParaRPr/>
+          </a:p>
+        </p:txBody>
+      </p:sp>
+    </p:spTree>
+  </p:cSld>
+  <p:clrMapOvr>
+    <a:masterClrMapping/>
+  </p:clrMapOvr>
+</p:notes>
+</file>
+
+<file path=ppt/notesSlides/notesSlide30.xml><?xml version="1.0" encoding="utf-8"?>
+<p:notes xmlns:a="http://schemas.openxmlformats.org/drawingml/2006/main" xmlns:r="http://schemas.openxmlformats.org/officeDocument/2006/relationships" xmlns:p="http://schemas.openxmlformats.org/presentationml/2006/main" showMasterSp="0" showMasterPhAnim="0">
+  <p:cSld>
+    <p:spTree>
+      <p:nvGrpSpPr>
+        <p:cNvPr id="1" name="Shape 832"/>
+        <p:cNvGrpSpPr/>
+        <p:nvPr/>
+      </p:nvGrpSpPr>
+      <p:grpSpPr>
+        <a:xfrm>
+          <a:off x="0" y="0"/>
+          <a:ext cx="0" cy="0"/>
+          <a:chOff x="0" y="0"/>
+          <a:chExt cx="0" cy="0"/>
+        </a:xfrm>
+      </p:grpSpPr>
+      <p:sp>
+        <p:nvSpPr>
+          <p:cNvPr id="833" name="Google Shape;833;g9d75e17901_0_81:notes"/>
+          <p:cNvSpPr>
+            <a:spLocks noGrp="1" noRot="1" noChangeAspect="1"/>
+          </p:cNvSpPr>
+          <p:nvPr>
+            <p:ph type="sldImg" idx="2"/>
+          </p:nvPr>
+        </p:nvSpPr>
+        <p:spPr>
+          <a:xfrm>
+            <a:off x="381000" y="685800"/>
+            <a:ext cx="6096000" cy="3429000"/>
+          </a:xfrm>
+          <a:custGeom>
+            <a:avLst/>
+            <a:gdLst/>
+            <a:ahLst/>
+            <a:cxnLst/>
+            <a:rect l="l" t="t" r="r" b="b"/>
+            <a:pathLst>
+              <a:path w="120000" h="120000" extrusionOk="0">
+                <a:moveTo>
+                  <a:pt x="0" y="0"/>
+                </a:moveTo>
+                <a:lnTo>
+                  <a:pt x="120000" y="0"/>
+                </a:lnTo>
+                <a:lnTo>
+                  <a:pt x="120000" y="120000"/>
+                </a:lnTo>
+                <a:lnTo>
+                  <a:pt x="0" y="120000"/>
+                </a:lnTo>
+                <a:close/>
+              </a:path>
+            </a:pathLst>
+          </a:custGeom>
+        </p:spPr>
+      </p:sp>
+      <p:sp>
+        <p:nvSpPr>
+          <p:cNvPr id="834" name="Google Shape;834;g9d75e17901_0_81:notes"/>
           <p:cNvSpPr txBox="1">
             <a:spLocks noGrp="1"/>
           </p:cNvSpPr>
@@ -16049,6 +16167,368 @@
             </a:pPr>
             <a:r>
               <a:rPr lang="en" dirty="0"/>
+              <a:t>DATASET PREPROCESSING EXAMPLE </a:t>
+            </a:r>
+            <a:endParaRPr dirty="0"/>
+          </a:p>
+        </p:txBody>
+      </p:sp>
+      <p:sp>
+        <p:nvSpPr>
+          <p:cNvPr id="363" name="Google Shape;363;p36"/>
+          <p:cNvSpPr txBox="1">
+            <a:spLocks noGrp="1"/>
+          </p:cNvSpPr>
+          <p:nvPr>
+            <p:ph type="subTitle" idx="1"/>
+          </p:nvPr>
+        </p:nvSpPr>
+        <p:spPr>
+          <a:xfrm>
+            <a:off x="609599" y="1603160"/>
+            <a:ext cx="7821126" cy="3178905"/>
+          </a:xfrm>
+          <a:prstGeom prst="rect">
+            <a:avLst/>
+          </a:prstGeom>
+        </p:spPr>
+        <p:txBody>
+          <a:bodyPr spcFirstLastPara="1" wrap="square" lIns="91425" tIns="91425" rIns="91425" bIns="91425" anchor="t" anchorCtr="0">
+            <a:noAutofit/>
+          </a:bodyPr>
+          <a:lstStyle/>
+          <a:p>
+            <a:pPr marL="285750" lvl="0" indent="-285750" algn="l">
+              <a:buFont typeface="Arial" panose="020B0604020202020204" pitchFamily="34" charset="0"/>
+              <a:buChar char="•"/>
+            </a:pPr>
+            <a:endParaRPr lang="en-SG" dirty="0"/>
+          </a:p>
+        </p:txBody>
+      </p:sp>
+      <p:grpSp>
+        <p:nvGrpSpPr>
+          <p:cNvPr id="370" name="Google Shape;370;p36"/>
+          <p:cNvGrpSpPr/>
+          <p:nvPr/>
+        </p:nvGrpSpPr>
+        <p:grpSpPr>
+          <a:xfrm>
+            <a:off x="-145105" y="2610211"/>
+            <a:ext cx="934519" cy="1551265"/>
+            <a:chOff x="197288" y="2680499"/>
+            <a:chExt cx="1156726" cy="1920120"/>
+          </a:xfrm>
+        </p:grpSpPr>
+        <p:sp>
+          <p:nvSpPr>
+            <p:cNvPr id="371" name="Google Shape;371;p36"/>
+            <p:cNvSpPr/>
+            <p:nvPr/>
+          </p:nvSpPr>
+          <p:spPr>
+            <a:xfrm>
+              <a:off x="197288" y="3755754"/>
+              <a:ext cx="945928" cy="844864"/>
+            </a:xfrm>
+            <a:custGeom>
+              <a:avLst/>
+              <a:gdLst/>
+              <a:ahLst/>
+              <a:cxnLst/>
+              <a:rect l="l" t="t" r="r" b="b"/>
+              <a:pathLst>
+                <a:path w="8873" h="7925" fill="none" extrusionOk="0">
+                  <a:moveTo>
+                    <a:pt x="6411" y="7924"/>
+                  </a:moveTo>
+                  <a:lnTo>
+                    <a:pt x="1026" y="3873"/>
+                  </a:lnTo>
+                  <a:cubicBezTo>
+                    <a:pt x="180" y="3232"/>
+                    <a:pt x="0" y="2052"/>
+                    <a:pt x="641" y="1206"/>
+                  </a:cubicBezTo>
+                  <a:lnTo>
+                    <a:pt x="795" y="1001"/>
+                  </a:lnTo>
+                  <a:cubicBezTo>
+                    <a:pt x="1436" y="154"/>
+                    <a:pt x="2616" y="1"/>
+                    <a:pt x="3462" y="616"/>
+                  </a:cubicBezTo>
+                  <a:lnTo>
+                    <a:pt x="8872" y="4668"/>
+                  </a:lnTo>
+                  <a:lnTo>
+                    <a:pt x="8462" y="5206"/>
+                  </a:lnTo>
+                  <a:cubicBezTo>
+                    <a:pt x="7770" y="6129"/>
+                    <a:pt x="6462" y="6309"/>
+                    <a:pt x="5565" y="5616"/>
+                  </a:cubicBezTo>
+                  <a:lnTo>
+                    <a:pt x="2616" y="3411"/>
+                  </a:lnTo>
+                  <a:cubicBezTo>
+                    <a:pt x="2308" y="3180"/>
+                    <a:pt x="2257" y="2770"/>
+                    <a:pt x="2488" y="2488"/>
+                  </a:cubicBezTo>
+                  <a:lnTo>
+                    <a:pt x="2667" y="2231"/>
+                  </a:lnTo>
+                  <a:cubicBezTo>
+                    <a:pt x="2898" y="1924"/>
+                    <a:pt x="3308" y="1872"/>
+                    <a:pt x="3590" y="2078"/>
+                  </a:cubicBezTo>
+                  <a:lnTo>
+                    <a:pt x="5821" y="3770"/>
+                  </a:lnTo>
+                </a:path>
+              </a:pathLst>
+            </a:custGeom>
+            <a:noFill/>
+            <a:ln w="28575" cap="rnd" cmpd="sng">
+              <a:solidFill>
+                <a:schemeClr val="dk1"/>
+              </a:solidFill>
+              <a:prstDash val="solid"/>
+              <a:miter lim="25642"/>
+              <a:headEnd type="none" w="sm" len="sm"/>
+              <a:tailEnd type="none" w="sm" len="sm"/>
+            </a:ln>
+          </p:spPr>
+          <p:txBody>
+            <a:bodyPr spcFirstLastPara="1" wrap="square" lIns="91425" tIns="91425" rIns="91425" bIns="91425" anchor="ctr" anchorCtr="0">
+              <a:noAutofit/>
+            </a:bodyPr>
+            <a:lstStyle/>
+            <a:p>
+              <a:pPr marL="0" lvl="0" indent="0" algn="l" rtl="0">
+                <a:spcBef>
+                  <a:spcPts val="0"/>
+                </a:spcBef>
+                <a:spcAft>
+                  <a:spcPts val="0"/>
+                </a:spcAft>
+                <a:buNone/>
+              </a:pPr>
+              <a:endParaRPr/>
+            </a:p>
+          </p:txBody>
+        </p:sp>
+        <p:sp>
+          <p:nvSpPr>
+            <p:cNvPr id="372" name="Google Shape;372;p36"/>
+            <p:cNvSpPr/>
+            <p:nvPr/>
+          </p:nvSpPr>
+          <p:spPr>
+            <a:xfrm rot="4438647">
+              <a:off x="344493" y="2829254"/>
+              <a:ext cx="945918" cy="844855"/>
+            </a:xfrm>
+            <a:custGeom>
+              <a:avLst/>
+              <a:gdLst/>
+              <a:ahLst/>
+              <a:cxnLst/>
+              <a:rect l="l" t="t" r="r" b="b"/>
+              <a:pathLst>
+                <a:path w="8873" h="7925" fill="none" extrusionOk="0">
+                  <a:moveTo>
+                    <a:pt x="6411" y="7924"/>
+                  </a:moveTo>
+                  <a:lnTo>
+                    <a:pt x="1026" y="3873"/>
+                  </a:lnTo>
+                  <a:cubicBezTo>
+                    <a:pt x="180" y="3232"/>
+                    <a:pt x="0" y="2052"/>
+                    <a:pt x="641" y="1206"/>
+                  </a:cubicBezTo>
+                  <a:lnTo>
+                    <a:pt x="795" y="1001"/>
+                  </a:lnTo>
+                  <a:cubicBezTo>
+                    <a:pt x="1436" y="154"/>
+                    <a:pt x="2616" y="1"/>
+                    <a:pt x="3462" y="616"/>
+                  </a:cubicBezTo>
+                  <a:lnTo>
+                    <a:pt x="8872" y="4668"/>
+                  </a:lnTo>
+                  <a:lnTo>
+                    <a:pt x="8462" y="5206"/>
+                  </a:lnTo>
+                  <a:cubicBezTo>
+                    <a:pt x="7770" y="6129"/>
+                    <a:pt x="6462" y="6309"/>
+                    <a:pt x="5565" y="5616"/>
+                  </a:cubicBezTo>
+                  <a:lnTo>
+                    <a:pt x="2616" y="3411"/>
+                  </a:lnTo>
+                  <a:cubicBezTo>
+                    <a:pt x="2308" y="3180"/>
+                    <a:pt x="2257" y="2770"/>
+                    <a:pt x="2488" y="2488"/>
+                  </a:cubicBezTo>
+                  <a:lnTo>
+                    <a:pt x="2667" y="2231"/>
+                  </a:lnTo>
+                  <a:cubicBezTo>
+                    <a:pt x="2898" y="1924"/>
+                    <a:pt x="3308" y="1872"/>
+                    <a:pt x="3590" y="2078"/>
+                  </a:cubicBezTo>
+                  <a:lnTo>
+                    <a:pt x="5821" y="3770"/>
+                  </a:lnTo>
+                </a:path>
+              </a:pathLst>
+            </a:custGeom>
+            <a:noFill/>
+            <a:ln w="28575" cap="rnd" cmpd="sng">
+              <a:solidFill>
+                <a:schemeClr val="dk1"/>
+              </a:solidFill>
+              <a:prstDash val="solid"/>
+              <a:miter lim="25642"/>
+              <a:headEnd type="none" w="sm" len="sm"/>
+              <a:tailEnd type="none" w="sm" len="sm"/>
+            </a:ln>
+          </p:spPr>
+          <p:txBody>
+            <a:bodyPr spcFirstLastPara="1" wrap="square" lIns="91425" tIns="91425" rIns="91425" bIns="91425" anchor="ctr" anchorCtr="0">
+              <a:noAutofit/>
+            </a:bodyPr>
+            <a:lstStyle/>
+            <a:p>
+              <a:pPr marL="0" lvl="0" indent="0" algn="l" rtl="0">
+                <a:spcBef>
+                  <a:spcPts val="0"/>
+                </a:spcBef>
+                <a:spcAft>
+                  <a:spcPts val="0"/>
+                </a:spcAft>
+                <a:buNone/>
+              </a:pPr>
+              <a:endParaRPr/>
+            </a:p>
+          </p:txBody>
+        </p:sp>
+      </p:grpSp>
+    </p:spTree>
+    <p:extLst>
+      <p:ext uri="{BB962C8B-B14F-4D97-AF65-F5344CB8AC3E}">
+        <p14:creationId xmlns:p14="http://schemas.microsoft.com/office/powerpoint/2010/main" val="690908902"/>
+      </p:ext>
+    </p:extLst>
+  </p:cSld>
+  <p:clrMapOvr>
+    <a:masterClrMapping/>
+  </p:clrMapOvr>
+</p:sld>
+</file>
+
+<file path=ppt/slides/slide14.xml><?xml version="1.0" encoding="utf-8"?>
+<p:sld xmlns:a="http://schemas.openxmlformats.org/drawingml/2006/main" xmlns:r="http://schemas.openxmlformats.org/officeDocument/2006/relationships" xmlns:p="http://schemas.openxmlformats.org/presentationml/2006/main">
+  <p:cSld>
+    <p:spTree>
+      <p:nvGrpSpPr>
+        <p:cNvPr id="1" name="Shape 359"/>
+        <p:cNvGrpSpPr/>
+        <p:nvPr/>
+      </p:nvGrpSpPr>
+      <p:grpSpPr>
+        <a:xfrm>
+          <a:off x="0" y="0"/>
+          <a:ext cx="0" cy="0"/>
+          <a:chOff x="0" y="0"/>
+          <a:chExt cx="0" cy="0"/>
+        </a:xfrm>
+      </p:grpSpPr>
+      <p:sp>
+        <p:nvSpPr>
+          <p:cNvPr id="360" name="Google Shape;360;p36"/>
+          <p:cNvSpPr/>
+          <p:nvPr/>
+        </p:nvSpPr>
+        <p:spPr>
+          <a:xfrm rot="-147394" flipH="1">
+            <a:off x="-31478" y="-267592"/>
+            <a:ext cx="8602005" cy="1561434"/>
+          </a:xfrm>
+          <a:prstGeom prst="rect">
+            <a:avLst/>
+          </a:prstGeom>
+          <a:solidFill>
+            <a:schemeClr val="accent1"/>
+          </a:solidFill>
+          <a:ln>
+            <a:noFill/>
+          </a:ln>
+        </p:spPr>
+        <p:txBody>
+          <a:bodyPr spcFirstLastPara="1" wrap="square" lIns="91425" tIns="91425" rIns="91425" bIns="91425" anchor="ctr" anchorCtr="0">
+            <a:noAutofit/>
+          </a:bodyPr>
+          <a:lstStyle/>
+          <a:p>
+            <a:pPr marL="0" lvl="0" indent="0" algn="l" rtl="0">
+              <a:spcBef>
+                <a:spcPts val="0"/>
+              </a:spcBef>
+              <a:spcAft>
+                <a:spcPts val="0"/>
+              </a:spcAft>
+              <a:buNone/>
+            </a:pPr>
+            <a:endParaRPr/>
+          </a:p>
+        </p:txBody>
+      </p:sp>
+      <p:sp>
+        <p:nvSpPr>
+          <p:cNvPr id="361" name="Google Shape;361;p36"/>
+          <p:cNvSpPr txBox="1">
+            <a:spLocks noGrp="1"/>
+          </p:cNvSpPr>
+          <p:nvPr>
+            <p:ph type="title"/>
+          </p:nvPr>
+        </p:nvSpPr>
+        <p:spPr>
+          <a:xfrm>
+            <a:off x="713225" y="539500"/>
+            <a:ext cx="7717500" cy="572700"/>
+          </a:xfrm>
+          <a:prstGeom prst="rect">
+            <a:avLst/>
+          </a:prstGeom>
+        </p:spPr>
+        <p:txBody>
+          <a:bodyPr spcFirstLastPara="1" wrap="square" lIns="91425" tIns="91425" rIns="91425" bIns="91425" anchor="ctr" anchorCtr="0">
+            <a:noAutofit/>
+          </a:bodyPr>
+          <a:lstStyle/>
+          <a:p>
+            <a:pPr marL="0" lvl="0" indent="0" algn="l" rtl="0">
+              <a:spcBef>
+                <a:spcPts val="0"/>
+              </a:spcBef>
+              <a:spcAft>
+                <a:spcPts val="0"/>
+              </a:spcAft>
+              <a:buNone/>
+            </a:pPr>
+            <a:r>
+              <a:rPr lang="en" dirty="0"/>
               <a:t>DATASET PREPROCESSING </a:t>
             </a:r>
             <a:endParaRPr dirty="0"/>
@@ -16388,7 +16868,7 @@
 </p:sld>
 </file>
 
-<file path=ppt/slides/slide14.xml><?xml version="1.0" encoding="utf-8"?>
+<file path=ppt/slides/slide15.xml><?xml version="1.0" encoding="utf-8"?>
 <p:sld xmlns:a="http://schemas.openxmlformats.org/drawingml/2006/main" xmlns:r="http://schemas.openxmlformats.org/officeDocument/2006/relationships" xmlns:p="http://schemas.openxmlformats.org/presentationml/2006/main">
   <p:cSld>
     <p:spTree>
@@ -17428,7 +17908,7 @@
 </p:sld>
 </file>
 
-<file path=ppt/slides/slide15.xml><?xml version="1.0" encoding="utf-8"?>
+<file path=ppt/slides/slide16.xml><?xml version="1.0" encoding="utf-8"?>
 <p:sld xmlns:a="http://schemas.openxmlformats.org/drawingml/2006/main" xmlns:r="http://schemas.openxmlformats.org/officeDocument/2006/relationships" xmlns:p="http://schemas.openxmlformats.org/presentationml/2006/main">
   <p:cSld>
     <p:spTree>
@@ -17863,7 +18343,7 @@
 </p:sld>
 </file>
 
-<file path=ppt/slides/slide16.xml><?xml version="1.0" encoding="utf-8"?>
+<file path=ppt/slides/slide17.xml><?xml version="1.0" encoding="utf-8"?>
 <p:sld xmlns:a="http://schemas.openxmlformats.org/drawingml/2006/main" xmlns:r="http://schemas.openxmlformats.org/officeDocument/2006/relationships" xmlns:p="http://schemas.openxmlformats.org/presentationml/2006/main">
   <p:cSld>
     <p:spTree>
@@ -18298,7 +18778,7 @@
 </p:sld>
 </file>
 
-<file path=ppt/slides/slide17.xml><?xml version="1.0" encoding="utf-8"?>
+<file path=ppt/slides/slide18.xml><?xml version="1.0" encoding="utf-8"?>
 <p:sld xmlns:a="http://schemas.openxmlformats.org/drawingml/2006/main" xmlns:r="http://schemas.openxmlformats.org/officeDocument/2006/relationships" xmlns:p="http://schemas.openxmlformats.org/presentationml/2006/main">
   <p:cSld>
     <p:spTree>
@@ -18797,7 +19277,7 @@
 </p:sld>
 </file>
 
-<file path=ppt/slides/slide18.xml><?xml version="1.0" encoding="utf-8"?>
+<file path=ppt/slides/slide19.xml><?xml version="1.0" encoding="utf-8"?>
 <p:sld xmlns:a="http://schemas.openxmlformats.org/drawingml/2006/main" xmlns:r="http://schemas.openxmlformats.org/officeDocument/2006/relationships" xmlns:p="http://schemas.openxmlformats.org/presentationml/2006/main">
   <p:cSld>
     <p:spTree>
@@ -19285,365 +19765,6 @@
 </p:sld>
 </file>
 
-<file path=ppt/slides/slide19.xml><?xml version="1.0" encoding="utf-8"?>
-<p:sld xmlns:a="http://schemas.openxmlformats.org/drawingml/2006/main" xmlns:r="http://schemas.openxmlformats.org/officeDocument/2006/relationships" xmlns:p="http://schemas.openxmlformats.org/presentationml/2006/main">
-  <p:cSld>
-    <p:spTree>
-      <p:nvGrpSpPr>
-        <p:cNvPr id="1" name="Shape 359"/>
-        <p:cNvGrpSpPr/>
-        <p:nvPr/>
-      </p:nvGrpSpPr>
-      <p:grpSpPr>
-        <a:xfrm>
-          <a:off x="0" y="0"/>
-          <a:ext cx="0" cy="0"/>
-          <a:chOff x="0" y="0"/>
-          <a:chExt cx="0" cy="0"/>
-        </a:xfrm>
-      </p:grpSpPr>
-      <p:sp>
-        <p:nvSpPr>
-          <p:cNvPr id="360" name="Google Shape;360;p36"/>
-          <p:cNvSpPr/>
-          <p:nvPr/>
-        </p:nvSpPr>
-        <p:spPr>
-          <a:xfrm rot="-147394" flipH="1">
-            <a:off x="-31478" y="-267592"/>
-            <a:ext cx="8602005" cy="1561434"/>
-          </a:xfrm>
-          <a:prstGeom prst="rect">
-            <a:avLst/>
-          </a:prstGeom>
-          <a:solidFill>
-            <a:schemeClr val="accent1"/>
-          </a:solidFill>
-          <a:ln>
-            <a:noFill/>
-          </a:ln>
-        </p:spPr>
-        <p:txBody>
-          <a:bodyPr spcFirstLastPara="1" wrap="square" lIns="91425" tIns="91425" rIns="91425" bIns="91425" anchor="ctr" anchorCtr="0">
-            <a:noAutofit/>
-          </a:bodyPr>
-          <a:lstStyle/>
-          <a:p>
-            <a:pPr marL="0" lvl="0" indent="0" algn="l" rtl="0">
-              <a:spcBef>
-                <a:spcPts val="0"/>
-              </a:spcBef>
-              <a:spcAft>
-                <a:spcPts val="0"/>
-              </a:spcAft>
-              <a:buNone/>
-            </a:pPr>
-            <a:endParaRPr/>
-          </a:p>
-        </p:txBody>
-      </p:sp>
-      <p:sp>
-        <p:nvSpPr>
-          <p:cNvPr id="361" name="Google Shape;361;p36"/>
-          <p:cNvSpPr txBox="1">
-            <a:spLocks noGrp="1"/>
-          </p:cNvSpPr>
-          <p:nvPr>
-            <p:ph type="title"/>
-          </p:nvPr>
-        </p:nvSpPr>
-        <p:spPr>
-          <a:xfrm>
-            <a:off x="713225" y="539500"/>
-            <a:ext cx="7717500" cy="572700"/>
-          </a:xfrm>
-          <a:prstGeom prst="rect">
-            <a:avLst/>
-          </a:prstGeom>
-        </p:spPr>
-        <p:txBody>
-          <a:bodyPr spcFirstLastPara="1" wrap="square" lIns="91425" tIns="91425" rIns="91425" bIns="91425" anchor="ctr" anchorCtr="0">
-            <a:noAutofit/>
-          </a:bodyPr>
-          <a:lstStyle/>
-          <a:p>
-            <a:pPr marL="0" lvl="0" indent="0" algn="l" rtl="0">
-              <a:spcBef>
-                <a:spcPts val="0"/>
-              </a:spcBef>
-              <a:spcAft>
-                <a:spcPts val="0"/>
-              </a:spcAft>
-              <a:buNone/>
-            </a:pPr>
-            <a:r>
-              <a:rPr lang="en" dirty="0"/>
-              <a:t>TOP 10 INDUSTRY</a:t>
-            </a:r>
-            <a:endParaRPr dirty="0"/>
-          </a:p>
-        </p:txBody>
-      </p:sp>
-      <p:grpSp>
-        <p:nvGrpSpPr>
-          <p:cNvPr id="370" name="Google Shape;370;p36"/>
-          <p:cNvGrpSpPr/>
-          <p:nvPr/>
-        </p:nvGrpSpPr>
-        <p:grpSpPr>
-          <a:xfrm>
-            <a:off x="-145105" y="2610211"/>
-            <a:ext cx="934519" cy="1551265"/>
-            <a:chOff x="197288" y="2680499"/>
-            <a:chExt cx="1156726" cy="1920120"/>
-          </a:xfrm>
-        </p:grpSpPr>
-        <p:sp>
-          <p:nvSpPr>
-            <p:cNvPr id="371" name="Google Shape;371;p36"/>
-            <p:cNvSpPr/>
-            <p:nvPr/>
-          </p:nvSpPr>
-          <p:spPr>
-            <a:xfrm>
-              <a:off x="197288" y="3755754"/>
-              <a:ext cx="945928" cy="844864"/>
-            </a:xfrm>
-            <a:custGeom>
-              <a:avLst/>
-              <a:gdLst/>
-              <a:ahLst/>
-              <a:cxnLst/>
-              <a:rect l="l" t="t" r="r" b="b"/>
-              <a:pathLst>
-                <a:path w="8873" h="7925" fill="none" extrusionOk="0">
-                  <a:moveTo>
-                    <a:pt x="6411" y="7924"/>
-                  </a:moveTo>
-                  <a:lnTo>
-                    <a:pt x="1026" y="3873"/>
-                  </a:lnTo>
-                  <a:cubicBezTo>
-                    <a:pt x="180" y="3232"/>
-                    <a:pt x="0" y="2052"/>
-                    <a:pt x="641" y="1206"/>
-                  </a:cubicBezTo>
-                  <a:lnTo>
-                    <a:pt x="795" y="1001"/>
-                  </a:lnTo>
-                  <a:cubicBezTo>
-                    <a:pt x="1436" y="154"/>
-                    <a:pt x="2616" y="1"/>
-                    <a:pt x="3462" y="616"/>
-                  </a:cubicBezTo>
-                  <a:lnTo>
-                    <a:pt x="8872" y="4668"/>
-                  </a:lnTo>
-                  <a:lnTo>
-                    <a:pt x="8462" y="5206"/>
-                  </a:lnTo>
-                  <a:cubicBezTo>
-                    <a:pt x="7770" y="6129"/>
-                    <a:pt x="6462" y="6309"/>
-                    <a:pt x="5565" y="5616"/>
-                  </a:cubicBezTo>
-                  <a:lnTo>
-                    <a:pt x="2616" y="3411"/>
-                  </a:lnTo>
-                  <a:cubicBezTo>
-                    <a:pt x="2308" y="3180"/>
-                    <a:pt x="2257" y="2770"/>
-                    <a:pt x="2488" y="2488"/>
-                  </a:cubicBezTo>
-                  <a:lnTo>
-                    <a:pt x="2667" y="2231"/>
-                  </a:lnTo>
-                  <a:cubicBezTo>
-                    <a:pt x="2898" y="1924"/>
-                    <a:pt x="3308" y="1872"/>
-                    <a:pt x="3590" y="2078"/>
-                  </a:cubicBezTo>
-                  <a:lnTo>
-                    <a:pt x="5821" y="3770"/>
-                  </a:lnTo>
-                </a:path>
-              </a:pathLst>
-            </a:custGeom>
-            <a:noFill/>
-            <a:ln w="28575" cap="rnd" cmpd="sng">
-              <a:solidFill>
-                <a:schemeClr val="dk1"/>
-              </a:solidFill>
-              <a:prstDash val="solid"/>
-              <a:miter lim="25642"/>
-              <a:headEnd type="none" w="sm" len="sm"/>
-              <a:tailEnd type="none" w="sm" len="sm"/>
-            </a:ln>
-          </p:spPr>
-          <p:txBody>
-            <a:bodyPr spcFirstLastPara="1" wrap="square" lIns="91425" tIns="91425" rIns="91425" bIns="91425" anchor="ctr" anchorCtr="0">
-              <a:noAutofit/>
-            </a:bodyPr>
-            <a:lstStyle/>
-            <a:p>
-              <a:pPr marL="0" lvl="0" indent="0" algn="l" rtl="0">
-                <a:spcBef>
-                  <a:spcPts val="0"/>
-                </a:spcBef>
-                <a:spcAft>
-                  <a:spcPts val="0"/>
-                </a:spcAft>
-                <a:buNone/>
-              </a:pPr>
-              <a:endParaRPr/>
-            </a:p>
-          </p:txBody>
-        </p:sp>
-        <p:sp>
-          <p:nvSpPr>
-            <p:cNvPr id="372" name="Google Shape;372;p36"/>
-            <p:cNvSpPr/>
-            <p:nvPr/>
-          </p:nvSpPr>
-          <p:spPr>
-            <a:xfrm rot="4438647">
-              <a:off x="344493" y="2829254"/>
-              <a:ext cx="945918" cy="844855"/>
-            </a:xfrm>
-            <a:custGeom>
-              <a:avLst/>
-              <a:gdLst/>
-              <a:ahLst/>
-              <a:cxnLst/>
-              <a:rect l="l" t="t" r="r" b="b"/>
-              <a:pathLst>
-                <a:path w="8873" h="7925" fill="none" extrusionOk="0">
-                  <a:moveTo>
-                    <a:pt x="6411" y="7924"/>
-                  </a:moveTo>
-                  <a:lnTo>
-                    <a:pt x="1026" y="3873"/>
-                  </a:lnTo>
-                  <a:cubicBezTo>
-                    <a:pt x="180" y="3232"/>
-                    <a:pt x="0" y="2052"/>
-                    <a:pt x="641" y="1206"/>
-                  </a:cubicBezTo>
-                  <a:lnTo>
-                    <a:pt x="795" y="1001"/>
-                  </a:lnTo>
-                  <a:cubicBezTo>
-                    <a:pt x="1436" y="154"/>
-                    <a:pt x="2616" y="1"/>
-                    <a:pt x="3462" y="616"/>
-                  </a:cubicBezTo>
-                  <a:lnTo>
-                    <a:pt x="8872" y="4668"/>
-                  </a:lnTo>
-                  <a:lnTo>
-                    <a:pt x="8462" y="5206"/>
-                  </a:lnTo>
-                  <a:cubicBezTo>
-                    <a:pt x="7770" y="6129"/>
-                    <a:pt x="6462" y="6309"/>
-                    <a:pt x="5565" y="5616"/>
-                  </a:cubicBezTo>
-                  <a:lnTo>
-                    <a:pt x="2616" y="3411"/>
-                  </a:lnTo>
-                  <a:cubicBezTo>
-                    <a:pt x="2308" y="3180"/>
-                    <a:pt x="2257" y="2770"/>
-                    <a:pt x="2488" y="2488"/>
-                  </a:cubicBezTo>
-                  <a:lnTo>
-                    <a:pt x="2667" y="2231"/>
-                  </a:lnTo>
-                  <a:cubicBezTo>
-                    <a:pt x="2898" y="1924"/>
-                    <a:pt x="3308" y="1872"/>
-                    <a:pt x="3590" y="2078"/>
-                  </a:cubicBezTo>
-                  <a:lnTo>
-                    <a:pt x="5821" y="3770"/>
-                  </a:lnTo>
-                </a:path>
-              </a:pathLst>
-            </a:custGeom>
-            <a:noFill/>
-            <a:ln w="28575" cap="rnd" cmpd="sng">
-              <a:solidFill>
-                <a:schemeClr val="dk1"/>
-              </a:solidFill>
-              <a:prstDash val="solid"/>
-              <a:miter lim="25642"/>
-              <a:headEnd type="none" w="sm" len="sm"/>
-              <a:tailEnd type="none" w="sm" len="sm"/>
-            </a:ln>
-          </p:spPr>
-          <p:txBody>
-            <a:bodyPr spcFirstLastPara="1" wrap="square" lIns="91425" tIns="91425" rIns="91425" bIns="91425" anchor="ctr" anchorCtr="0">
-              <a:noAutofit/>
-            </a:bodyPr>
-            <a:lstStyle/>
-            <a:p>
-              <a:pPr marL="0" lvl="0" indent="0" algn="l" rtl="0">
-                <a:spcBef>
-                  <a:spcPts val="0"/>
-                </a:spcBef>
-                <a:spcAft>
-                  <a:spcPts val="0"/>
-                </a:spcAft>
-                <a:buNone/>
-              </a:pPr>
-              <a:endParaRPr/>
-            </a:p>
-          </p:txBody>
-        </p:sp>
-      </p:grpSp>
-      <p:pic>
-        <p:nvPicPr>
-          <p:cNvPr id="2" name="Picture 1">
-            <a:extLst>
-              <a:ext uri="{FF2B5EF4-FFF2-40B4-BE49-F238E27FC236}">
-                <a16:creationId xmlns:a16="http://schemas.microsoft.com/office/drawing/2014/main" id="{04A8AFA9-C4BD-B742-97EE-0D23120C9CCD}"/>
-              </a:ext>
-            </a:extLst>
-          </p:cNvPr>
-          <p:cNvPicPr>
-            <a:picLocks noChangeAspect="1"/>
-          </p:cNvPicPr>
-          <p:nvPr/>
-        </p:nvPicPr>
-        <p:blipFill>
-          <a:blip r:embed="rId3"/>
-          <a:stretch>
-            <a:fillRect/>
-          </a:stretch>
-        </p:blipFill>
-        <p:spPr>
-          <a:xfrm>
-            <a:off x="856956" y="1712769"/>
-            <a:ext cx="5067300" cy="2717800"/>
-          </a:xfrm>
-          <a:prstGeom prst="rect">
-            <a:avLst/>
-          </a:prstGeom>
-        </p:spPr>
-      </p:pic>
-    </p:spTree>
-    <p:extLst>
-      <p:ext uri="{BB962C8B-B14F-4D97-AF65-F5344CB8AC3E}">
-        <p14:creationId xmlns:p14="http://schemas.microsoft.com/office/powerpoint/2010/main" val="1527968670"/>
-      </p:ext>
-    </p:extLst>
-  </p:cSld>
-  <p:clrMapOvr>
-    <a:masterClrMapping/>
-  </p:clrMapOvr>
-</p:sld>
-</file>
-
 <file path=ppt/slides/slide2.xml><?xml version="1.0" encoding="utf-8"?>
 <p:sld xmlns:a="http://schemas.openxmlformats.org/drawingml/2006/main" xmlns:r="http://schemas.openxmlformats.org/officeDocument/2006/relationships" xmlns:p="http://schemas.openxmlformats.org/presentationml/2006/main">
   <p:cSld>
@@ -23214,6 +23335,365 @@
             </a:pPr>
             <a:r>
               <a:rPr lang="en" dirty="0"/>
+              <a:t>TOP 10 INDUSTRY</a:t>
+            </a:r>
+            <a:endParaRPr dirty="0"/>
+          </a:p>
+        </p:txBody>
+      </p:sp>
+      <p:grpSp>
+        <p:nvGrpSpPr>
+          <p:cNvPr id="370" name="Google Shape;370;p36"/>
+          <p:cNvGrpSpPr/>
+          <p:nvPr/>
+        </p:nvGrpSpPr>
+        <p:grpSpPr>
+          <a:xfrm>
+            <a:off x="-145105" y="2610211"/>
+            <a:ext cx="934519" cy="1551265"/>
+            <a:chOff x="197288" y="2680499"/>
+            <a:chExt cx="1156726" cy="1920120"/>
+          </a:xfrm>
+        </p:grpSpPr>
+        <p:sp>
+          <p:nvSpPr>
+            <p:cNvPr id="371" name="Google Shape;371;p36"/>
+            <p:cNvSpPr/>
+            <p:nvPr/>
+          </p:nvSpPr>
+          <p:spPr>
+            <a:xfrm>
+              <a:off x="197288" y="3755754"/>
+              <a:ext cx="945928" cy="844864"/>
+            </a:xfrm>
+            <a:custGeom>
+              <a:avLst/>
+              <a:gdLst/>
+              <a:ahLst/>
+              <a:cxnLst/>
+              <a:rect l="l" t="t" r="r" b="b"/>
+              <a:pathLst>
+                <a:path w="8873" h="7925" fill="none" extrusionOk="0">
+                  <a:moveTo>
+                    <a:pt x="6411" y="7924"/>
+                  </a:moveTo>
+                  <a:lnTo>
+                    <a:pt x="1026" y="3873"/>
+                  </a:lnTo>
+                  <a:cubicBezTo>
+                    <a:pt x="180" y="3232"/>
+                    <a:pt x="0" y="2052"/>
+                    <a:pt x="641" y="1206"/>
+                  </a:cubicBezTo>
+                  <a:lnTo>
+                    <a:pt x="795" y="1001"/>
+                  </a:lnTo>
+                  <a:cubicBezTo>
+                    <a:pt x="1436" y="154"/>
+                    <a:pt x="2616" y="1"/>
+                    <a:pt x="3462" y="616"/>
+                  </a:cubicBezTo>
+                  <a:lnTo>
+                    <a:pt x="8872" y="4668"/>
+                  </a:lnTo>
+                  <a:lnTo>
+                    <a:pt x="8462" y="5206"/>
+                  </a:lnTo>
+                  <a:cubicBezTo>
+                    <a:pt x="7770" y="6129"/>
+                    <a:pt x="6462" y="6309"/>
+                    <a:pt x="5565" y="5616"/>
+                  </a:cubicBezTo>
+                  <a:lnTo>
+                    <a:pt x="2616" y="3411"/>
+                  </a:lnTo>
+                  <a:cubicBezTo>
+                    <a:pt x="2308" y="3180"/>
+                    <a:pt x="2257" y="2770"/>
+                    <a:pt x="2488" y="2488"/>
+                  </a:cubicBezTo>
+                  <a:lnTo>
+                    <a:pt x="2667" y="2231"/>
+                  </a:lnTo>
+                  <a:cubicBezTo>
+                    <a:pt x="2898" y="1924"/>
+                    <a:pt x="3308" y="1872"/>
+                    <a:pt x="3590" y="2078"/>
+                  </a:cubicBezTo>
+                  <a:lnTo>
+                    <a:pt x="5821" y="3770"/>
+                  </a:lnTo>
+                </a:path>
+              </a:pathLst>
+            </a:custGeom>
+            <a:noFill/>
+            <a:ln w="28575" cap="rnd" cmpd="sng">
+              <a:solidFill>
+                <a:schemeClr val="dk1"/>
+              </a:solidFill>
+              <a:prstDash val="solid"/>
+              <a:miter lim="25642"/>
+              <a:headEnd type="none" w="sm" len="sm"/>
+              <a:tailEnd type="none" w="sm" len="sm"/>
+            </a:ln>
+          </p:spPr>
+          <p:txBody>
+            <a:bodyPr spcFirstLastPara="1" wrap="square" lIns="91425" tIns="91425" rIns="91425" bIns="91425" anchor="ctr" anchorCtr="0">
+              <a:noAutofit/>
+            </a:bodyPr>
+            <a:lstStyle/>
+            <a:p>
+              <a:pPr marL="0" lvl="0" indent="0" algn="l" rtl="0">
+                <a:spcBef>
+                  <a:spcPts val="0"/>
+                </a:spcBef>
+                <a:spcAft>
+                  <a:spcPts val="0"/>
+                </a:spcAft>
+                <a:buNone/>
+              </a:pPr>
+              <a:endParaRPr/>
+            </a:p>
+          </p:txBody>
+        </p:sp>
+        <p:sp>
+          <p:nvSpPr>
+            <p:cNvPr id="372" name="Google Shape;372;p36"/>
+            <p:cNvSpPr/>
+            <p:nvPr/>
+          </p:nvSpPr>
+          <p:spPr>
+            <a:xfrm rot="4438647">
+              <a:off x="344493" y="2829254"/>
+              <a:ext cx="945918" cy="844855"/>
+            </a:xfrm>
+            <a:custGeom>
+              <a:avLst/>
+              <a:gdLst/>
+              <a:ahLst/>
+              <a:cxnLst/>
+              <a:rect l="l" t="t" r="r" b="b"/>
+              <a:pathLst>
+                <a:path w="8873" h="7925" fill="none" extrusionOk="0">
+                  <a:moveTo>
+                    <a:pt x="6411" y="7924"/>
+                  </a:moveTo>
+                  <a:lnTo>
+                    <a:pt x="1026" y="3873"/>
+                  </a:lnTo>
+                  <a:cubicBezTo>
+                    <a:pt x="180" y="3232"/>
+                    <a:pt x="0" y="2052"/>
+                    <a:pt x="641" y="1206"/>
+                  </a:cubicBezTo>
+                  <a:lnTo>
+                    <a:pt x="795" y="1001"/>
+                  </a:lnTo>
+                  <a:cubicBezTo>
+                    <a:pt x="1436" y="154"/>
+                    <a:pt x="2616" y="1"/>
+                    <a:pt x="3462" y="616"/>
+                  </a:cubicBezTo>
+                  <a:lnTo>
+                    <a:pt x="8872" y="4668"/>
+                  </a:lnTo>
+                  <a:lnTo>
+                    <a:pt x="8462" y="5206"/>
+                  </a:lnTo>
+                  <a:cubicBezTo>
+                    <a:pt x="7770" y="6129"/>
+                    <a:pt x="6462" y="6309"/>
+                    <a:pt x="5565" y="5616"/>
+                  </a:cubicBezTo>
+                  <a:lnTo>
+                    <a:pt x="2616" y="3411"/>
+                  </a:lnTo>
+                  <a:cubicBezTo>
+                    <a:pt x="2308" y="3180"/>
+                    <a:pt x="2257" y="2770"/>
+                    <a:pt x="2488" y="2488"/>
+                  </a:cubicBezTo>
+                  <a:lnTo>
+                    <a:pt x="2667" y="2231"/>
+                  </a:lnTo>
+                  <a:cubicBezTo>
+                    <a:pt x="2898" y="1924"/>
+                    <a:pt x="3308" y="1872"/>
+                    <a:pt x="3590" y="2078"/>
+                  </a:cubicBezTo>
+                  <a:lnTo>
+                    <a:pt x="5821" y="3770"/>
+                  </a:lnTo>
+                </a:path>
+              </a:pathLst>
+            </a:custGeom>
+            <a:noFill/>
+            <a:ln w="28575" cap="rnd" cmpd="sng">
+              <a:solidFill>
+                <a:schemeClr val="dk1"/>
+              </a:solidFill>
+              <a:prstDash val="solid"/>
+              <a:miter lim="25642"/>
+              <a:headEnd type="none" w="sm" len="sm"/>
+              <a:tailEnd type="none" w="sm" len="sm"/>
+            </a:ln>
+          </p:spPr>
+          <p:txBody>
+            <a:bodyPr spcFirstLastPara="1" wrap="square" lIns="91425" tIns="91425" rIns="91425" bIns="91425" anchor="ctr" anchorCtr="0">
+              <a:noAutofit/>
+            </a:bodyPr>
+            <a:lstStyle/>
+            <a:p>
+              <a:pPr marL="0" lvl="0" indent="0" algn="l" rtl="0">
+                <a:spcBef>
+                  <a:spcPts val="0"/>
+                </a:spcBef>
+                <a:spcAft>
+                  <a:spcPts val="0"/>
+                </a:spcAft>
+                <a:buNone/>
+              </a:pPr>
+              <a:endParaRPr/>
+            </a:p>
+          </p:txBody>
+        </p:sp>
+      </p:grpSp>
+      <p:pic>
+        <p:nvPicPr>
+          <p:cNvPr id="2" name="Picture 1">
+            <a:extLst>
+              <a:ext uri="{FF2B5EF4-FFF2-40B4-BE49-F238E27FC236}">
+                <a16:creationId xmlns:a16="http://schemas.microsoft.com/office/drawing/2014/main" id="{04A8AFA9-C4BD-B742-97EE-0D23120C9CCD}"/>
+              </a:ext>
+            </a:extLst>
+          </p:cNvPr>
+          <p:cNvPicPr>
+            <a:picLocks noChangeAspect="1"/>
+          </p:cNvPicPr>
+          <p:nvPr/>
+        </p:nvPicPr>
+        <p:blipFill>
+          <a:blip r:embed="rId3"/>
+          <a:stretch>
+            <a:fillRect/>
+          </a:stretch>
+        </p:blipFill>
+        <p:spPr>
+          <a:xfrm>
+            <a:off x="856956" y="1712769"/>
+            <a:ext cx="5067300" cy="2717800"/>
+          </a:xfrm>
+          <a:prstGeom prst="rect">
+            <a:avLst/>
+          </a:prstGeom>
+        </p:spPr>
+      </p:pic>
+    </p:spTree>
+    <p:extLst>
+      <p:ext uri="{BB962C8B-B14F-4D97-AF65-F5344CB8AC3E}">
+        <p14:creationId xmlns:p14="http://schemas.microsoft.com/office/powerpoint/2010/main" val="1527968670"/>
+      </p:ext>
+    </p:extLst>
+  </p:cSld>
+  <p:clrMapOvr>
+    <a:masterClrMapping/>
+  </p:clrMapOvr>
+</p:sld>
+</file>
+
+<file path=ppt/slides/slide21.xml><?xml version="1.0" encoding="utf-8"?>
+<p:sld xmlns:a="http://schemas.openxmlformats.org/drawingml/2006/main" xmlns:r="http://schemas.openxmlformats.org/officeDocument/2006/relationships" xmlns:p="http://schemas.openxmlformats.org/presentationml/2006/main">
+  <p:cSld>
+    <p:spTree>
+      <p:nvGrpSpPr>
+        <p:cNvPr id="1" name="Shape 359"/>
+        <p:cNvGrpSpPr/>
+        <p:nvPr/>
+      </p:nvGrpSpPr>
+      <p:grpSpPr>
+        <a:xfrm>
+          <a:off x="0" y="0"/>
+          <a:ext cx="0" cy="0"/>
+          <a:chOff x="0" y="0"/>
+          <a:chExt cx="0" cy="0"/>
+        </a:xfrm>
+      </p:grpSpPr>
+      <p:sp>
+        <p:nvSpPr>
+          <p:cNvPr id="360" name="Google Shape;360;p36"/>
+          <p:cNvSpPr/>
+          <p:nvPr/>
+        </p:nvSpPr>
+        <p:spPr>
+          <a:xfrm rot="-147394" flipH="1">
+            <a:off x="-31478" y="-267592"/>
+            <a:ext cx="8602005" cy="1561434"/>
+          </a:xfrm>
+          <a:prstGeom prst="rect">
+            <a:avLst/>
+          </a:prstGeom>
+          <a:solidFill>
+            <a:schemeClr val="accent1"/>
+          </a:solidFill>
+          <a:ln>
+            <a:noFill/>
+          </a:ln>
+        </p:spPr>
+        <p:txBody>
+          <a:bodyPr spcFirstLastPara="1" wrap="square" lIns="91425" tIns="91425" rIns="91425" bIns="91425" anchor="ctr" anchorCtr="0">
+            <a:noAutofit/>
+          </a:bodyPr>
+          <a:lstStyle/>
+          <a:p>
+            <a:pPr marL="0" lvl="0" indent="0" algn="l" rtl="0">
+              <a:spcBef>
+                <a:spcPts val="0"/>
+              </a:spcBef>
+              <a:spcAft>
+                <a:spcPts val="0"/>
+              </a:spcAft>
+              <a:buNone/>
+            </a:pPr>
+            <a:endParaRPr/>
+          </a:p>
+        </p:txBody>
+      </p:sp>
+      <p:sp>
+        <p:nvSpPr>
+          <p:cNvPr id="361" name="Google Shape;361;p36"/>
+          <p:cNvSpPr txBox="1">
+            <a:spLocks noGrp="1"/>
+          </p:cNvSpPr>
+          <p:nvPr>
+            <p:ph type="title"/>
+          </p:nvPr>
+        </p:nvSpPr>
+        <p:spPr>
+          <a:xfrm>
+            <a:off x="713225" y="539500"/>
+            <a:ext cx="7717500" cy="572700"/>
+          </a:xfrm>
+          <a:prstGeom prst="rect">
+            <a:avLst/>
+          </a:prstGeom>
+        </p:spPr>
+        <p:txBody>
+          <a:bodyPr spcFirstLastPara="1" wrap="square" lIns="91425" tIns="91425" rIns="91425" bIns="91425" anchor="ctr" anchorCtr="0">
+            <a:noAutofit/>
+          </a:bodyPr>
+          <a:lstStyle/>
+          <a:p>
+            <a:pPr marL="0" lvl="0" indent="0" algn="l" rtl="0">
+              <a:spcBef>
+                <a:spcPts val="0"/>
+              </a:spcBef>
+              <a:spcAft>
+                <a:spcPts val="0"/>
+              </a:spcAft>
+              <a:buNone/>
+            </a:pPr>
+            <a:r>
+              <a:rPr lang="en" dirty="0"/>
               <a:t>TOP 10 SECTOR</a:t>
             </a:r>
             <a:endParaRPr dirty="0"/>
@@ -23480,7 +23960,7 @@
 </p:sld>
 </file>
 
-<file path=ppt/slides/slide21.xml><?xml version="1.0" encoding="utf-8"?>
+<file path=ppt/slides/slide22.xml><?xml version="1.0" encoding="utf-8"?>
 <p:sld xmlns:a="http://schemas.openxmlformats.org/drawingml/2006/main" xmlns:r="http://schemas.openxmlformats.org/officeDocument/2006/relationships" xmlns:p="http://schemas.openxmlformats.org/presentationml/2006/main">
   <p:cSld>
     <p:spTree>
@@ -23839,7 +24319,7 @@
 </p:sld>
 </file>
 
-<file path=ppt/slides/slide22.xml><?xml version="1.0" encoding="utf-8"?>
+<file path=ppt/slides/slide23.xml><?xml version="1.0" encoding="utf-8"?>
 <p:sld xmlns:a="http://schemas.openxmlformats.org/drawingml/2006/main" xmlns:r="http://schemas.openxmlformats.org/officeDocument/2006/relationships" xmlns:p="http://schemas.openxmlformats.org/presentationml/2006/main">
   <p:cSld>
     <p:spTree>
@@ -24228,7 +24708,7 @@
 </p:sld>
 </file>
 
-<file path=ppt/slides/slide23.xml><?xml version="1.0" encoding="utf-8"?>
+<file path=ppt/slides/slide24.xml><?xml version="1.0" encoding="utf-8"?>
 <p:sld xmlns:a="http://schemas.openxmlformats.org/drawingml/2006/main" xmlns:r="http://schemas.openxmlformats.org/officeDocument/2006/relationships" xmlns:p="http://schemas.openxmlformats.org/presentationml/2006/main">
   <p:cSld>
     <p:spTree>
@@ -25275,7 +25755,7 @@
 </p:sld>
 </file>
 
-<file path=ppt/slides/slide24.xml><?xml version="1.0" encoding="utf-8"?>
+<file path=ppt/slides/slide25.xml><?xml version="1.0" encoding="utf-8"?>
 <p:sld xmlns:a="http://schemas.openxmlformats.org/drawingml/2006/main" xmlns:r="http://schemas.openxmlformats.org/officeDocument/2006/relationships" xmlns:p="http://schemas.openxmlformats.org/presentationml/2006/main">
   <p:cSld>
     <p:spTree>
@@ -25640,7 +26120,7 @@
 </p:sld>
 </file>
 
-<file path=ppt/slides/slide25.xml><?xml version="1.0" encoding="utf-8"?>
+<file path=ppt/slides/slide26.xml><?xml version="1.0" encoding="utf-8"?>
 <p:sld xmlns:a="http://schemas.openxmlformats.org/drawingml/2006/main" xmlns:r="http://schemas.openxmlformats.org/officeDocument/2006/relationships" xmlns:p="http://schemas.openxmlformats.org/presentationml/2006/main">
   <p:cSld>
     <p:spTree>
@@ -26683,7 +27163,7 @@
 </p:sld>
 </file>
 
-<file path=ppt/slides/slide26.xml><?xml version="1.0" encoding="utf-8"?>
+<file path=ppt/slides/slide27.xml><?xml version="1.0" encoding="utf-8"?>
 <p:sld xmlns:a="http://schemas.openxmlformats.org/drawingml/2006/main" xmlns:r="http://schemas.openxmlformats.org/officeDocument/2006/relationships" xmlns:p="http://schemas.openxmlformats.org/presentationml/2006/main">
   <p:cSld>
     <p:spTree>
@@ -27098,7 +27578,7 @@
 </p:sld>
 </file>
 
-<file path=ppt/slides/slide27.xml><?xml version="1.0" encoding="utf-8"?>
+<file path=ppt/slides/slide28.xml><?xml version="1.0" encoding="utf-8"?>
 <p:sld xmlns:a="http://schemas.openxmlformats.org/drawingml/2006/main" xmlns:r="http://schemas.openxmlformats.org/officeDocument/2006/relationships" xmlns:p="http://schemas.openxmlformats.org/presentationml/2006/main">
   <p:cSld>
     <p:spTree>
@@ -28141,7 +28621,7 @@
 </p:sld>
 </file>
 
-<file path=ppt/slides/slide28.xml><?xml version="1.0" encoding="utf-8"?>
+<file path=ppt/slides/slide29.xml><?xml version="1.0" encoding="utf-8"?>
 <p:sld xmlns:a="http://schemas.openxmlformats.org/drawingml/2006/main" xmlns:r="http://schemas.openxmlformats.org/officeDocument/2006/relationships" xmlns:p="http://schemas.openxmlformats.org/presentationml/2006/main">
   <p:cSld>
     <p:spTree>
@@ -28566,7 +29046,1050 @@
 </p:sld>
 </file>
 
-<file path=ppt/slides/slide29.xml><?xml version="1.0" encoding="utf-8"?>
+<file path=ppt/slides/slide3.xml><?xml version="1.0" encoding="utf-8"?>
+<p:sld xmlns:a="http://schemas.openxmlformats.org/drawingml/2006/main" xmlns:r="http://schemas.openxmlformats.org/officeDocument/2006/relationships" xmlns:p="http://schemas.openxmlformats.org/presentationml/2006/main">
+  <p:cSld>
+    <p:spTree>
+      <p:nvGrpSpPr>
+        <p:cNvPr id="1" name="Shape 330"/>
+        <p:cNvGrpSpPr/>
+        <p:nvPr/>
+      </p:nvGrpSpPr>
+      <p:grpSpPr>
+        <a:xfrm>
+          <a:off x="0" y="0"/>
+          <a:ext cx="0" cy="0"/>
+          <a:chOff x="0" y="0"/>
+          <a:chExt cx="0" cy="0"/>
+        </a:xfrm>
+      </p:grpSpPr>
+      <p:sp>
+        <p:nvSpPr>
+          <p:cNvPr id="331" name="Google Shape;331;p34"/>
+          <p:cNvSpPr/>
+          <p:nvPr/>
+        </p:nvSpPr>
+        <p:spPr>
+          <a:xfrm rot="213351" flipH="1">
+            <a:off x="1667358" y="978954"/>
+            <a:ext cx="5809284" cy="3185840"/>
+          </a:xfrm>
+          <a:prstGeom prst="rect">
+            <a:avLst/>
+          </a:prstGeom>
+          <a:solidFill>
+            <a:schemeClr val="accent1"/>
+          </a:solidFill>
+          <a:ln>
+            <a:noFill/>
+          </a:ln>
+        </p:spPr>
+        <p:txBody>
+          <a:bodyPr spcFirstLastPara="1" wrap="square" lIns="91425" tIns="91425" rIns="91425" bIns="91425" anchor="ctr" anchorCtr="0">
+            <a:noAutofit/>
+          </a:bodyPr>
+          <a:lstStyle/>
+          <a:p>
+            <a:pPr marL="0" lvl="0" indent="0" algn="l" rtl="0">
+              <a:spcBef>
+                <a:spcPts val="0"/>
+              </a:spcBef>
+              <a:spcAft>
+                <a:spcPts val="0"/>
+              </a:spcAft>
+              <a:buNone/>
+            </a:pPr>
+            <a:endParaRPr/>
+          </a:p>
+        </p:txBody>
+      </p:sp>
+      <p:sp>
+        <p:nvSpPr>
+          <p:cNvPr id="332" name="Google Shape;332;p34"/>
+          <p:cNvSpPr txBox="1">
+            <a:spLocks noGrp="1"/>
+          </p:cNvSpPr>
+          <p:nvPr>
+            <p:ph type="title"/>
+          </p:nvPr>
+        </p:nvSpPr>
+        <p:spPr>
+          <a:xfrm>
+            <a:off x="2374800" y="2517700"/>
+            <a:ext cx="4394400" cy="841800"/>
+          </a:xfrm>
+          <a:prstGeom prst="rect">
+            <a:avLst/>
+          </a:prstGeom>
+        </p:spPr>
+        <p:txBody>
+          <a:bodyPr spcFirstLastPara="1" wrap="square" lIns="91425" tIns="91425" rIns="91425" bIns="91425" anchor="ctr" anchorCtr="0">
+            <a:noAutofit/>
+          </a:bodyPr>
+          <a:lstStyle/>
+          <a:p>
+            <a:pPr marL="0" lvl="0" indent="0" algn="ctr" rtl="0">
+              <a:spcBef>
+                <a:spcPts val="0"/>
+              </a:spcBef>
+              <a:spcAft>
+                <a:spcPts val="0"/>
+              </a:spcAft>
+              <a:buNone/>
+            </a:pPr>
+            <a:r>
+              <a:rPr lang="en" sz="3200" dirty="0"/>
+              <a:t>GOAL &amp; PROBLEM STATEMENT</a:t>
+            </a:r>
+            <a:endParaRPr sz="3200" dirty="0"/>
+          </a:p>
+        </p:txBody>
+      </p:sp>
+      <p:sp>
+        <p:nvSpPr>
+          <p:cNvPr id="333" name="Google Shape;333;p34"/>
+          <p:cNvSpPr txBox="1">
+            <a:spLocks noGrp="1"/>
+          </p:cNvSpPr>
+          <p:nvPr>
+            <p:ph type="title" idx="2"/>
+          </p:nvPr>
+        </p:nvSpPr>
+        <p:spPr>
+          <a:xfrm>
+            <a:off x="2374800" y="1340150"/>
+            <a:ext cx="4394400" cy="1310100"/>
+          </a:xfrm>
+          <a:prstGeom prst="rect">
+            <a:avLst/>
+          </a:prstGeom>
+        </p:spPr>
+        <p:txBody>
+          <a:bodyPr spcFirstLastPara="1" wrap="square" lIns="91425" tIns="91425" rIns="91425" bIns="91425" anchor="ctr" anchorCtr="0">
+            <a:noAutofit/>
+          </a:bodyPr>
+          <a:lstStyle/>
+          <a:p>
+            <a:pPr marL="0" lvl="0" indent="0" algn="ctr" rtl="0">
+              <a:spcBef>
+                <a:spcPts val="0"/>
+              </a:spcBef>
+              <a:spcAft>
+                <a:spcPts val="0"/>
+              </a:spcAft>
+              <a:buNone/>
+            </a:pPr>
+            <a:r>
+              <a:rPr lang="en" dirty="0"/>
+              <a:t>01</a:t>
+            </a:r>
+            <a:endParaRPr dirty="0"/>
+          </a:p>
+        </p:txBody>
+      </p:sp>
+      <p:sp>
+        <p:nvSpPr>
+          <p:cNvPr id="334" name="Google Shape;334;p34"/>
+          <p:cNvSpPr txBox="1">
+            <a:spLocks noGrp="1"/>
+          </p:cNvSpPr>
+          <p:nvPr>
+            <p:ph type="subTitle" idx="1"/>
+          </p:nvPr>
+        </p:nvSpPr>
+        <p:spPr>
+          <a:xfrm>
+            <a:off x="2374800" y="3408475"/>
+            <a:ext cx="4394400" cy="442800"/>
+          </a:xfrm>
+          <a:prstGeom prst="rect">
+            <a:avLst/>
+          </a:prstGeom>
+        </p:spPr>
+        <p:txBody>
+          <a:bodyPr spcFirstLastPara="1" wrap="square" lIns="91425" tIns="91425" rIns="91425" bIns="91425" anchor="t" anchorCtr="0">
+            <a:noAutofit/>
+          </a:bodyPr>
+          <a:lstStyle/>
+          <a:p>
+            <a:pPr marL="0" lvl="0" indent="0" algn="ctr" rtl="0">
+              <a:spcBef>
+                <a:spcPts val="0"/>
+              </a:spcBef>
+              <a:spcAft>
+                <a:spcPts val="0"/>
+              </a:spcAft>
+              <a:buNone/>
+            </a:pPr>
+            <a:r>
+              <a:rPr lang="en" dirty="0"/>
+              <a:t>What to achieve for this project</a:t>
+            </a:r>
+            <a:endParaRPr dirty="0"/>
+          </a:p>
+        </p:txBody>
+      </p:sp>
+      <p:grpSp>
+        <p:nvGrpSpPr>
+          <p:cNvPr id="335" name="Google Shape;335;p34"/>
+          <p:cNvGrpSpPr/>
+          <p:nvPr/>
+        </p:nvGrpSpPr>
+        <p:grpSpPr>
+          <a:xfrm rot="-2026318">
+            <a:off x="6264543" y="-8947"/>
+            <a:ext cx="2674335" cy="2862666"/>
+            <a:chOff x="6201089" y="32925"/>
+            <a:chExt cx="699625" cy="748894"/>
+          </a:xfrm>
+        </p:grpSpPr>
+        <p:sp>
+          <p:nvSpPr>
+            <p:cNvPr id="336" name="Google Shape;336;p34"/>
+            <p:cNvSpPr/>
+            <p:nvPr/>
+          </p:nvSpPr>
+          <p:spPr>
+            <a:xfrm>
+              <a:off x="6201089" y="32925"/>
+              <a:ext cx="699625" cy="748894"/>
+            </a:xfrm>
+            <a:custGeom>
+              <a:avLst/>
+              <a:gdLst/>
+              <a:ahLst/>
+              <a:cxnLst/>
+              <a:rect l="l" t="t" r="r" b="b"/>
+              <a:pathLst>
+                <a:path w="19156" h="20505" extrusionOk="0">
+                  <a:moveTo>
+                    <a:pt x="5667" y="0"/>
+                  </a:moveTo>
+                  <a:lnTo>
+                    <a:pt x="0" y="15796"/>
+                  </a:lnTo>
+                  <a:lnTo>
+                    <a:pt x="12950" y="20463"/>
+                  </a:lnTo>
+                  <a:cubicBezTo>
+                    <a:pt x="13029" y="20491"/>
+                    <a:pt x="13108" y="20505"/>
+                    <a:pt x="13185" y="20505"/>
+                  </a:cubicBezTo>
+                  <a:cubicBezTo>
+                    <a:pt x="13456" y="20505"/>
+                    <a:pt x="13696" y="20338"/>
+                    <a:pt x="13796" y="20078"/>
+                  </a:cubicBezTo>
+                  <a:lnTo>
+                    <a:pt x="19053" y="5539"/>
+                  </a:lnTo>
+                  <a:cubicBezTo>
+                    <a:pt x="19155" y="5180"/>
+                    <a:pt x="18976" y="4795"/>
+                    <a:pt x="18642" y="4693"/>
+                  </a:cubicBezTo>
+                  <a:lnTo>
+                    <a:pt x="5667" y="0"/>
+                  </a:lnTo>
+                  <a:close/>
+                </a:path>
+              </a:pathLst>
+            </a:custGeom>
+            <a:solidFill>
+              <a:schemeClr val="dk2"/>
+            </a:solidFill>
+            <a:ln>
+              <a:noFill/>
+            </a:ln>
+          </p:spPr>
+          <p:txBody>
+            <a:bodyPr spcFirstLastPara="1" wrap="square" lIns="91425" tIns="91425" rIns="91425" bIns="91425" anchor="ctr" anchorCtr="0">
+              <a:noAutofit/>
+            </a:bodyPr>
+            <a:lstStyle/>
+            <a:p>
+              <a:pPr marL="0" lvl="0" indent="0" algn="l" rtl="0">
+                <a:spcBef>
+                  <a:spcPts val="0"/>
+                </a:spcBef>
+                <a:spcAft>
+                  <a:spcPts val="0"/>
+                </a:spcAft>
+                <a:buNone/>
+              </a:pPr>
+              <a:endParaRPr/>
+            </a:p>
+          </p:txBody>
+        </p:sp>
+        <p:sp>
+          <p:nvSpPr>
+            <p:cNvPr id="337" name="Google Shape;337;p34"/>
+            <p:cNvSpPr/>
+            <p:nvPr/>
+          </p:nvSpPr>
+          <p:spPr>
+            <a:xfrm>
+              <a:off x="6301309" y="69448"/>
+              <a:ext cx="221984" cy="581621"/>
+            </a:xfrm>
+            <a:custGeom>
+              <a:avLst/>
+              <a:gdLst/>
+              <a:ahLst/>
+              <a:cxnLst/>
+              <a:rect l="l" t="t" r="r" b="b"/>
+              <a:pathLst>
+                <a:path w="6078" h="15925" extrusionOk="0">
+                  <a:moveTo>
+                    <a:pt x="5693" y="0"/>
+                  </a:moveTo>
+                  <a:lnTo>
+                    <a:pt x="0" y="15796"/>
+                  </a:lnTo>
+                  <a:lnTo>
+                    <a:pt x="385" y="15924"/>
+                  </a:lnTo>
+                  <a:lnTo>
+                    <a:pt x="6077" y="129"/>
+                  </a:lnTo>
+                  <a:lnTo>
+                    <a:pt x="5693" y="0"/>
+                  </a:lnTo>
+                  <a:close/>
+                </a:path>
+              </a:pathLst>
+            </a:custGeom>
+            <a:solidFill>
+              <a:schemeClr val="dk1"/>
+            </a:solidFill>
+            <a:ln>
+              <a:noFill/>
+            </a:ln>
+          </p:spPr>
+          <p:txBody>
+            <a:bodyPr spcFirstLastPara="1" wrap="square" lIns="91425" tIns="91425" rIns="91425" bIns="91425" anchor="ctr" anchorCtr="0">
+              <a:noAutofit/>
+            </a:bodyPr>
+            <a:lstStyle/>
+            <a:p>
+              <a:pPr marL="0" lvl="0" indent="0" algn="l" rtl="0">
+                <a:spcBef>
+                  <a:spcPts val="0"/>
+                </a:spcBef>
+                <a:spcAft>
+                  <a:spcPts val="0"/>
+                </a:spcAft>
+                <a:buNone/>
+              </a:pPr>
+              <a:endParaRPr/>
+            </a:p>
+          </p:txBody>
+        </p:sp>
+        <p:sp>
+          <p:nvSpPr>
+            <p:cNvPr id="338" name="Google Shape;338;p34"/>
+            <p:cNvSpPr/>
+            <p:nvPr/>
+          </p:nvSpPr>
+          <p:spPr>
+            <a:xfrm>
+              <a:off x="6467052" y="311088"/>
+              <a:ext cx="293166" cy="199486"/>
+            </a:xfrm>
+            <a:custGeom>
+              <a:avLst/>
+              <a:gdLst/>
+              <a:ahLst/>
+              <a:cxnLst/>
+              <a:rect l="l" t="t" r="r" b="b"/>
+              <a:pathLst>
+                <a:path w="8027" h="5462" extrusionOk="0">
+                  <a:moveTo>
+                    <a:pt x="1052" y="0"/>
+                  </a:moveTo>
+                  <a:lnTo>
+                    <a:pt x="1" y="2949"/>
+                  </a:lnTo>
+                  <a:lnTo>
+                    <a:pt x="6975" y="5462"/>
+                  </a:lnTo>
+                  <a:lnTo>
+                    <a:pt x="8027" y="2513"/>
+                  </a:lnTo>
+                  <a:lnTo>
+                    <a:pt x="1052" y="0"/>
+                  </a:lnTo>
+                  <a:close/>
+                </a:path>
+              </a:pathLst>
+            </a:custGeom>
+            <a:solidFill>
+              <a:schemeClr val="lt1"/>
+            </a:solidFill>
+            <a:ln>
+              <a:noFill/>
+            </a:ln>
+          </p:spPr>
+          <p:txBody>
+            <a:bodyPr spcFirstLastPara="1" wrap="square" lIns="91425" tIns="91425" rIns="91425" bIns="91425" anchor="ctr" anchorCtr="0">
+              <a:noAutofit/>
+            </a:bodyPr>
+            <a:lstStyle/>
+            <a:p>
+              <a:pPr marL="0" lvl="0" indent="0" algn="l" rtl="0">
+                <a:spcBef>
+                  <a:spcPts val="0"/>
+                </a:spcBef>
+                <a:spcAft>
+                  <a:spcPts val="0"/>
+                </a:spcAft>
+                <a:buNone/>
+              </a:pPr>
+              <a:endParaRPr/>
+            </a:p>
+          </p:txBody>
+        </p:sp>
+        <p:sp>
+          <p:nvSpPr>
+            <p:cNvPr id="339" name="Google Shape;339;p34"/>
+            <p:cNvSpPr/>
+            <p:nvPr/>
+          </p:nvSpPr>
+          <p:spPr>
+            <a:xfrm>
+              <a:off x="6354670" y="100347"/>
+              <a:ext cx="91598" cy="91014"/>
+            </a:xfrm>
+            <a:custGeom>
+              <a:avLst/>
+              <a:gdLst/>
+              <a:ahLst/>
+              <a:cxnLst/>
+              <a:rect l="l" t="t" r="r" b="b"/>
+              <a:pathLst>
+                <a:path w="2508" h="2492" extrusionOk="0">
+                  <a:moveTo>
+                    <a:pt x="821" y="1"/>
+                  </a:moveTo>
+                  <a:lnTo>
+                    <a:pt x="693" y="334"/>
+                  </a:lnTo>
+                  <a:cubicBezTo>
+                    <a:pt x="796" y="334"/>
+                    <a:pt x="898" y="360"/>
+                    <a:pt x="1001" y="385"/>
+                  </a:cubicBezTo>
+                  <a:cubicBezTo>
+                    <a:pt x="2015" y="754"/>
+                    <a:pt x="1620" y="2160"/>
+                    <a:pt x="710" y="2160"/>
+                  </a:cubicBezTo>
+                  <a:cubicBezTo>
+                    <a:pt x="608" y="2160"/>
+                    <a:pt x="499" y="2142"/>
+                    <a:pt x="385" y="2103"/>
+                  </a:cubicBezTo>
+                  <a:cubicBezTo>
+                    <a:pt x="283" y="2052"/>
+                    <a:pt x="206" y="2001"/>
+                    <a:pt x="129" y="1949"/>
+                  </a:cubicBezTo>
+                  <a:lnTo>
+                    <a:pt x="1" y="2257"/>
+                  </a:lnTo>
+                  <a:cubicBezTo>
+                    <a:pt x="78" y="2308"/>
+                    <a:pt x="180" y="2360"/>
+                    <a:pt x="257" y="2411"/>
+                  </a:cubicBezTo>
+                  <a:cubicBezTo>
+                    <a:pt x="417" y="2466"/>
+                    <a:pt x="569" y="2491"/>
+                    <a:pt x="713" y="2491"/>
+                  </a:cubicBezTo>
+                  <a:cubicBezTo>
+                    <a:pt x="1969" y="2491"/>
+                    <a:pt x="2508" y="561"/>
+                    <a:pt x="1103" y="78"/>
+                  </a:cubicBezTo>
+                  <a:cubicBezTo>
+                    <a:pt x="1001" y="52"/>
+                    <a:pt x="924" y="26"/>
+                    <a:pt x="821" y="1"/>
+                  </a:cubicBezTo>
+                  <a:close/>
+                </a:path>
+              </a:pathLst>
+            </a:custGeom>
+            <a:solidFill>
+              <a:schemeClr val="accent1"/>
+            </a:solidFill>
+            <a:ln>
+              <a:noFill/>
+            </a:ln>
+          </p:spPr>
+          <p:txBody>
+            <a:bodyPr spcFirstLastPara="1" wrap="square" lIns="91425" tIns="91425" rIns="91425" bIns="91425" anchor="ctr" anchorCtr="0">
+              <a:noAutofit/>
+            </a:bodyPr>
+            <a:lstStyle/>
+            <a:p>
+              <a:pPr marL="0" lvl="0" indent="0" algn="l" rtl="0">
+                <a:spcBef>
+                  <a:spcPts val="0"/>
+                </a:spcBef>
+                <a:spcAft>
+                  <a:spcPts val="0"/>
+                </a:spcAft>
+                <a:buNone/>
+              </a:pPr>
+              <a:endParaRPr/>
+            </a:p>
+          </p:txBody>
+        </p:sp>
+        <p:sp>
+          <p:nvSpPr>
+            <p:cNvPr id="340" name="Google Shape;340;p34"/>
+            <p:cNvSpPr/>
+            <p:nvPr/>
+          </p:nvSpPr>
+          <p:spPr>
+            <a:xfrm>
+              <a:off x="6309709" y="225842"/>
+              <a:ext cx="91379" cy="90320"/>
+            </a:xfrm>
+            <a:custGeom>
+              <a:avLst/>
+              <a:gdLst/>
+              <a:ahLst/>
+              <a:cxnLst/>
+              <a:rect l="l" t="t" r="r" b="b"/>
+              <a:pathLst>
+                <a:path w="2502" h="2473" extrusionOk="0">
+                  <a:moveTo>
+                    <a:pt x="821" y="1"/>
+                  </a:moveTo>
+                  <a:lnTo>
+                    <a:pt x="693" y="308"/>
+                  </a:lnTo>
+                  <a:cubicBezTo>
+                    <a:pt x="796" y="308"/>
+                    <a:pt x="898" y="334"/>
+                    <a:pt x="1001" y="360"/>
+                  </a:cubicBezTo>
+                  <a:cubicBezTo>
+                    <a:pt x="2010" y="727"/>
+                    <a:pt x="1624" y="2141"/>
+                    <a:pt x="724" y="2141"/>
+                  </a:cubicBezTo>
+                  <a:cubicBezTo>
+                    <a:pt x="618" y="2141"/>
+                    <a:pt x="504" y="2121"/>
+                    <a:pt x="386" y="2078"/>
+                  </a:cubicBezTo>
+                  <a:cubicBezTo>
+                    <a:pt x="283" y="2026"/>
+                    <a:pt x="206" y="1975"/>
+                    <a:pt x="129" y="1924"/>
+                  </a:cubicBezTo>
+                  <a:lnTo>
+                    <a:pt x="1" y="2257"/>
+                  </a:lnTo>
+                  <a:cubicBezTo>
+                    <a:pt x="78" y="2309"/>
+                    <a:pt x="180" y="2334"/>
+                    <a:pt x="257" y="2385"/>
+                  </a:cubicBezTo>
+                  <a:cubicBezTo>
+                    <a:pt x="424" y="2446"/>
+                    <a:pt x="582" y="2473"/>
+                    <a:pt x="730" y="2473"/>
+                  </a:cubicBezTo>
+                  <a:cubicBezTo>
+                    <a:pt x="1974" y="2473"/>
+                    <a:pt x="2501" y="556"/>
+                    <a:pt x="1103" y="52"/>
+                  </a:cubicBezTo>
+                  <a:cubicBezTo>
+                    <a:pt x="1001" y="26"/>
+                    <a:pt x="924" y="1"/>
+                    <a:pt x="821" y="1"/>
+                  </a:cubicBezTo>
+                  <a:close/>
+                </a:path>
+              </a:pathLst>
+            </a:custGeom>
+            <a:solidFill>
+              <a:schemeClr val="accent1"/>
+            </a:solidFill>
+            <a:ln>
+              <a:noFill/>
+            </a:ln>
+          </p:spPr>
+          <p:txBody>
+            <a:bodyPr spcFirstLastPara="1" wrap="square" lIns="91425" tIns="91425" rIns="91425" bIns="91425" anchor="ctr" anchorCtr="0">
+              <a:noAutofit/>
+            </a:bodyPr>
+            <a:lstStyle/>
+            <a:p>
+              <a:pPr marL="0" lvl="0" indent="0" algn="l" rtl="0">
+                <a:spcBef>
+                  <a:spcPts val="0"/>
+                </a:spcBef>
+                <a:spcAft>
+                  <a:spcPts val="0"/>
+                </a:spcAft>
+                <a:buNone/>
+              </a:pPr>
+              <a:endParaRPr/>
+            </a:p>
+          </p:txBody>
+        </p:sp>
+        <p:sp>
+          <p:nvSpPr>
+            <p:cNvPr id="341" name="Google Shape;341;p34"/>
+            <p:cNvSpPr/>
+            <p:nvPr/>
+          </p:nvSpPr>
+          <p:spPr>
+            <a:xfrm>
+              <a:off x="6264786" y="350423"/>
+              <a:ext cx="91343" cy="90320"/>
+            </a:xfrm>
+            <a:custGeom>
+              <a:avLst/>
+              <a:gdLst/>
+              <a:ahLst/>
+              <a:cxnLst/>
+              <a:rect l="l" t="t" r="r" b="b"/>
+              <a:pathLst>
+                <a:path w="2501" h="2473" extrusionOk="0">
+                  <a:moveTo>
+                    <a:pt x="821" y="0"/>
+                  </a:moveTo>
+                  <a:lnTo>
+                    <a:pt x="692" y="333"/>
+                  </a:lnTo>
+                  <a:cubicBezTo>
+                    <a:pt x="795" y="333"/>
+                    <a:pt x="898" y="333"/>
+                    <a:pt x="1000" y="385"/>
+                  </a:cubicBezTo>
+                  <a:cubicBezTo>
+                    <a:pt x="2009" y="729"/>
+                    <a:pt x="1623" y="2140"/>
+                    <a:pt x="723" y="2140"/>
+                  </a:cubicBezTo>
+                  <a:cubicBezTo>
+                    <a:pt x="617" y="2140"/>
+                    <a:pt x="504" y="2120"/>
+                    <a:pt x="385" y="2077"/>
+                  </a:cubicBezTo>
+                  <a:cubicBezTo>
+                    <a:pt x="282" y="2052"/>
+                    <a:pt x="205" y="2000"/>
+                    <a:pt x="128" y="1923"/>
+                  </a:cubicBezTo>
+                  <a:lnTo>
+                    <a:pt x="0" y="2257"/>
+                  </a:lnTo>
+                  <a:cubicBezTo>
+                    <a:pt x="77" y="2308"/>
+                    <a:pt x="180" y="2359"/>
+                    <a:pt x="256" y="2385"/>
+                  </a:cubicBezTo>
+                  <a:cubicBezTo>
+                    <a:pt x="423" y="2445"/>
+                    <a:pt x="581" y="2472"/>
+                    <a:pt x="730" y="2472"/>
+                  </a:cubicBezTo>
+                  <a:cubicBezTo>
+                    <a:pt x="1974" y="2472"/>
+                    <a:pt x="2500" y="555"/>
+                    <a:pt x="1103" y="51"/>
+                  </a:cubicBezTo>
+                  <a:cubicBezTo>
+                    <a:pt x="1000" y="26"/>
+                    <a:pt x="923" y="0"/>
+                    <a:pt x="821" y="0"/>
+                  </a:cubicBezTo>
+                  <a:close/>
+                </a:path>
+              </a:pathLst>
+            </a:custGeom>
+            <a:solidFill>
+              <a:schemeClr val="accent1"/>
+            </a:solidFill>
+            <a:ln>
+              <a:noFill/>
+            </a:ln>
+          </p:spPr>
+          <p:txBody>
+            <a:bodyPr spcFirstLastPara="1" wrap="square" lIns="91425" tIns="91425" rIns="91425" bIns="91425" anchor="ctr" anchorCtr="0">
+              <a:noAutofit/>
+            </a:bodyPr>
+            <a:lstStyle/>
+            <a:p>
+              <a:pPr marL="0" lvl="0" indent="0" algn="l" rtl="0">
+                <a:spcBef>
+                  <a:spcPts val="0"/>
+                </a:spcBef>
+                <a:spcAft>
+                  <a:spcPts val="0"/>
+                </a:spcAft>
+                <a:buNone/>
+              </a:pPr>
+              <a:endParaRPr/>
+            </a:p>
+          </p:txBody>
+        </p:sp>
+        <p:sp>
+          <p:nvSpPr>
+            <p:cNvPr id="342" name="Google Shape;342;p34"/>
+            <p:cNvSpPr/>
+            <p:nvPr/>
+          </p:nvSpPr>
+          <p:spPr>
+            <a:xfrm>
+              <a:off x="6219825" y="474969"/>
+              <a:ext cx="91343" cy="90320"/>
+            </a:xfrm>
+            <a:custGeom>
+              <a:avLst/>
+              <a:gdLst/>
+              <a:ahLst/>
+              <a:cxnLst/>
+              <a:rect l="l" t="t" r="r" b="b"/>
+              <a:pathLst>
+                <a:path w="2501" h="2473" extrusionOk="0">
+                  <a:moveTo>
+                    <a:pt x="821" y="1"/>
+                  </a:moveTo>
+                  <a:lnTo>
+                    <a:pt x="693" y="334"/>
+                  </a:lnTo>
+                  <a:cubicBezTo>
+                    <a:pt x="795" y="334"/>
+                    <a:pt x="898" y="334"/>
+                    <a:pt x="1000" y="385"/>
+                  </a:cubicBezTo>
+                  <a:cubicBezTo>
+                    <a:pt x="2008" y="752"/>
+                    <a:pt x="1625" y="2141"/>
+                    <a:pt x="727" y="2141"/>
+                  </a:cubicBezTo>
+                  <a:cubicBezTo>
+                    <a:pt x="620" y="2141"/>
+                    <a:pt x="505" y="2121"/>
+                    <a:pt x="385" y="2078"/>
+                  </a:cubicBezTo>
+                  <a:cubicBezTo>
+                    <a:pt x="282" y="2052"/>
+                    <a:pt x="205" y="2001"/>
+                    <a:pt x="128" y="1949"/>
+                  </a:cubicBezTo>
+                  <a:lnTo>
+                    <a:pt x="0" y="2257"/>
+                  </a:lnTo>
+                  <a:cubicBezTo>
+                    <a:pt x="77" y="2308"/>
+                    <a:pt x="180" y="2360"/>
+                    <a:pt x="257" y="2385"/>
+                  </a:cubicBezTo>
+                  <a:cubicBezTo>
+                    <a:pt x="423" y="2445"/>
+                    <a:pt x="582" y="2473"/>
+                    <a:pt x="730" y="2473"/>
+                  </a:cubicBezTo>
+                  <a:cubicBezTo>
+                    <a:pt x="1974" y="2473"/>
+                    <a:pt x="2500" y="556"/>
+                    <a:pt x="1103" y="52"/>
+                  </a:cubicBezTo>
+                  <a:lnTo>
+                    <a:pt x="1103" y="52"/>
+                  </a:lnTo>
+                  <a:lnTo>
+                    <a:pt x="1103" y="78"/>
+                  </a:lnTo>
+                  <a:cubicBezTo>
+                    <a:pt x="1000" y="26"/>
+                    <a:pt x="923" y="26"/>
+                    <a:pt x="821" y="1"/>
+                  </a:cubicBezTo>
+                  <a:close/>
+                </a:path>
+              </a:pathLst>
+            </a:custGeom>
+            <a:solidFill>
+              <a:schemeClr val="accent1"/>
+            </a:solidFill>
+            <a:ln>
+              <a:noFill/>
+            </a:ln>
+          </p:spPr>
+          <p:txBody>
+            <a:bodyPr spcFirstLastPara="1" wrap="square" lIns="91425" tIns="91425" rIns="91425" bIns="91425" anchor="ctr" anchorCtr="0">
+              <a:noAutofit/>
+            </a:bodyPr>
+            <a:lstStyle/>
+            <a:p>
+              <a:pPr marL="0" lvl="0" indent="0" algn="l" rtl="0">
+                <a:spcBef>
+                  <a:spcPts val="0"/>
+                </a:spcBef>
+                <a:spcAft>
+                  <a:spcPts val="0"/>
+                </a:spcAft>
+                <a:buNone/>
+              </a:pPr>
+              <a:endParaRPr/>
+            </a:p>
+          </p:txBody>
+        </p:sp>
+        <p:sp>
+          <p:nvSpPr>
+            <p:cNvPr id="343" name="Google Shape;343;p34"/>
+            <p:cNvSpPr/>
+            <p:nvPr/>
+          </p:nvSpPr>
+          <p:spPr>
+            <a:xfrm>
+              <a:off x="6363107" y="137820"/>
+              <a:ext cx="19686" cy="7524"/>
+            </a:xfrm>
+            <a:custGeom>
+              <a:avLst/>
+              <a:gdLst/>
+              <a:ahLst/>
+              <a:cxnLst/>
+              <a:rect l="l" t="t" r="r" b="b"/>
+              <a:pathLst>
+                <a:path w="539" h="206" fill="none" extrusionOk="0">
+                  <a:moveTo>
+                    <a:pt x="0" y="0"/>
+                  </a:moveTo>
+                  <a:lnTo>
+                    <a:pt x="539" y="205"/>
+                  </a:lnTo>
+                </a:path>
+              </a:pathLst>
+            </a:custGeom>
+            <a:noFill/>
+            <a:ln w="9625" cap="rnd" cmpd="sng">
+              <a:solidFill>
+                <a:schemeClr val="lt1"/>
+              </a:solidFill>
+              <a:prstDash val="solid"/>
+              <a:miter lim="25642"/>
+              <a:headEnd type="none" w="sm" len="sm"/>
+              <a:tailEnd type="none" w="sm" len="sm"/>
+            </a:ln>
+          </p:spPr>
+          <p:txBody>
+            <a:bodyPr spcFirstLastPara="1" wrap="square" lIns="91425" tIns="91425" rIns="91425" bIns="91425" anchor="ctr" anchorCtr="0">
+              <a:noAutofit/>
+            </a:bodyPr>
+            <a:lstStyle/>
+            <a:p>
+              <a:pPr marL="0" lvl="0" indent="0" algn="l" rtl="0">
+                <a:spcBef>
+                  <a:spcPts val="0"/>
+                </a:spcBef>
+                <a:spcAft>
+                  <a:spcPts val="0"/>
+                </a:spcAft>
+                <a:buNone/>
+              </a:pPr>
+              <a:endParaRPr/>
+            </a:p>
+          </p:txBody>
+        </p:sp>
+        <p:sp>
+          <p:nvSpPr>
+            <p:cNvPr id="344" name="Google Shape;344;p34"/>
+            <p:cNvSpPr/>
+            <p:nvPr/>
+          </p:nvSpPr>
+          <p:spPr>
+            <a:xfrm>
+              <a:off x="6318146" y="264265"/>
+              <a:ext cx="18773" cy="6574"/>
+            </a:xfrm>
+            <a:custGeom>
+              <a:avLst/>
+              <a:gdLst/>
+              <a:ahLst/>
+              <a:cxnLst/>
+              <a:rect l="l" t="t" r="r" b="b"/>
+              <a:pathLst>
+                <a:path w="514" h="180" fill="none" extrusionOk="0">
+                  <a:moveTo>
+                    <a:pt x="1" y="0"/>
+                  </a:moveTo>
+                  <a:lnTo>
+                    <a:pt x="513" y="180"/>
+                  </a:lnTo>
+                </a:path>
+              </a:pathLst>
+            </a:custGeom>
+            <a:noFill/>
+            <a:ln w="9625" cap="rnd" cmpd="sng">
+              <a:solidFill>
+                <a:schemeClr val="lt1"/>
+              </a:solidFill>
+              <a:prstDash val="solid"/>
+              <a:miter lim="25642"/>
+              <a:headEnd type="none" w="sm" len="sm"/>
+              <a:tailEnd type="none" w="sm" len="sm"/>
+            </a:ln>
+          </p:spPr>
+          <p:txBody>
+            <a:bodyPr spcFirstLastPara="1" wrap="square" lIns="91425" tIns="91425" rIns="91425" bIns="91425" anchor="ctr" anchorCtr="0">
+              <a:noAutofit/>
+            </a:bodyPr>
+            <a:lstStyle/>
+            <a:p>
+              <a:pPr marL="0" lvl="0" indent="0" algn="l" rtl="0">
+                <a:spcBef>
+                  <a:spcPts val="0"/>
+                </a:spcBef>
+                <a:spcAft>
+                  <a:spcPts val="0"/>
+                </a:spcAft>
+                <a:buNone/>
+              </a:pPr>
+              <a:endParaRPr/>
+            </a:p>
+          </p:txBody>
+        </p:sp>
+        <p:sp>
+          <p:nvSpPr>
+            <p:cNvPr id="345" name="Google Shape;345;p34"/>
+            <p:cNvSpPr/>
+            <p:nvPr/>
+          </p:nvSpPr>
+          <p:spPr>
+            <a:xfrm>
+              <a:off x="6272273" y="389759"/>
+              <a:ext cx="19686" cy="7524"/>
+            </a:xfrm>
+            <a:custGeom>
+              <a:avLst/>
+              <a:gdLst/>
+              <a:ahLst/>
+              <a:cxnLst/>
+              <a:rect l="l" t="t" r="r" b="b"/>
+              <a:pathLst>
+                <a:path w="539" h="206" fill="none" extrusionOk="0">
+                  <a:moveTo>
+                    <a:pt x="0" y="0"/>
+                  </a:moveTo>
+                  <a:lnTo>
+                    <a:pt x="539" y="205"/>
+                  </a:lnTo>
+                </a:path>
+              </a:pathLst>
+            </a:custGeom>
+            <a:noFill/>
+            <a:ln w="9625" cap="rnd" cmpd="sng">
+              <a:solidFill>
+                <a:schemeClr val="lt1"/>
+              </a:solidFill>
+              <a:prstDash val="solid"/>
+              <a:miter lim="25642"/>
+              <a:headEnd type="none" w="sm" len="sm"/>
+              <a:tailEnd type="none" w="sm" len="sm"/>
+            </a:ln>
+          </p:spPr>
+          <p:txBody>
+            <a:bodyPr spcFirstLastPara="1" wrap="square" lIns="91425" tIns="91425" rIns="91425" bIns="91425" anchor="ctr" anchorCtr="0">
+              <a:noAutofit/>
+            </a:bodyPr>
+            <a:lstStyle/>
+            <a:p>
+              <a:pPr marL="0" lvl="0" indent="0" algn="l" rtl="0">
+                <a:spcBef>
+                  <a:spcPts val="0"/>
+                </a:spcBef>
+                <a:spcAft>
+                  <a:spcPts val="0"/>
+                </a:spcAft>
+                <a:buNone/>
+              </a:pPr>
+              <a:endParaRPr/>
+            </a:p>
+          </p:txBody>
+        </p:sp>
+        <p:sp>
+          <p:nvSpPr>
+            <p:cNvPr id="346" name="Google Shape;346;p34"/>
+            <p:cNvSpPr/>
+            <p:nvPr/>
+          </p:nvSpPr>
+          <p:spPr>
+            <a:xfrm>
+              <a:off x="6227313" y="516167"/>
+              <a:ext cx="18773" cy="6611"/>
+            </a:xfrm>
+            <a:custGeom>
+              <a:avLst/>
+              <a:gdLst/>
+              <a:ahLst/>
+              <a:cxnLst/>
+              <a:rect l="l" t="t" r="r" b="b"/>
+              <a:pathLst>
+                <a:path w="514" h="181" fill="none" extrusionOk="0">
+                  <a:moveTo>
+                    <a:pt x="0" y="1"/>
+                  </a:moveTo>
+                  <a:lnTo>
+                    <a:pt x="513" y="180"/>
+                  </a:lnTo>
+                </a:path>
+              </a:pathLst>
+            </a:custGeom>
+            <a:noFill/>
+            <a:ln w="9625" cap="rnd" cmpd="sng">
+              <a:solidFill>
+                <a:schemeClr val="lt1"/>
+              </a:solidFill>
+              <a:prstDash val="solid"/>
+              <a:miter lim="25642"/>
+              <a:headEnd type="none" w="sm" len="sm"/>
+              <a:tailEnd type="none" w="sm" len="sm"/>
+            </a:ln>
+          </p:spPr>
+          <p:txBody>
+            <a:bodyPr spcFirstLastPara="1" wrap="square" lIns="91425" tIns="91425" rIns="91425" bIns="91425" anchor="ctr" anchorCtr="0">
+              <a:noAutofit/>
+            </a:bodyPr>
+            <a:lstStyle/>
+            <a:p>
+              <a:pPr marL="0" lvl="0" indent="0" algn="l" rtl="0">
+                <a:spcBef>
+                  <a:spcPts val="0"/>
+                </a:spcBef>
+                <a:spcAft>
+                  <a:spcPts val="0"/>
+                </a:spcAft>
+                <a:buNone/>
+              </a:pPr>
+              <a:endParaRPr/>
+            </a:p>
+          </p:txBody>
+        </p:sp>
+      </p:grpSp>
+    </p:spTree>
+  </p:cSld>
+  <p:clrMapOvr>
+    <a:masterClrMapping/>
+  </p:clrMapOvr>
+</p:sld>
+</file>
+
+<file path=ppt/slides/slide30.xml><?xml version="1.0" encoding="utf-8"?>
 <p:sld xmlns:a="http://schemas.openxmlformats.org/drawingml/2006/main" xmlns:r="http://schemas.openxmlformats.org/officeDocument/2006/relationships" xmlns:p="http://schemas.openxmlformats.org/presentationml/2006/main">
   <p:cSld>
     <p:spTree>
@@ -30038,1049 +31561,6 @@
 </p:sld>
 </file>
 
-<file path=ppt/slides/slide3.xml><?xml version="1.0" encoding="utf-8"?>
-<p:sld xmlns:a="http://schemas.openxmlformats.org/drawingml/2006/main" xmlns:r="http://schemas.openxmlformats.org/officeDocument/2006/relationships" xmlns:p="http://schemas.openxmlformats.org/presentationml/2006/main">
-  <p:cSld>
-    <p:spTree>
-      <p:nvGrpSpPr>
-        <p:cNvPr id="1" name="Shape 330"/>
-        <p:cNvGrpSpPr/>
-        <p:nvPr/>
-      </p:nvGrpSpPr>
-      <p:grpSpPr>
-        <a:xfrm>
-          <a:off x="0" y="0"/>
-          <a:ext cx="0" cy="0"/>
-          <a:chOff x="0" y="0"/>
-          <a:chExt cx="0" cy="0"/>
-        </a:xfrm>
-      </p:grpSpPr>
-      <p:sp>
-        <p:nvSpPr>
-          <p:cNvPr id="331" name="Google Shape;331;p34"/>
-          <p:cNvSpPr/>
-          <p:nvPr/>
-        </p:nvSpPr>
-        <p:spPr>
-          <a:xfrm rot="213351" flipH="1">
-            <a:off x="1667358" y="978954"/>
-            <a:ext cx="5809284" cy="3185840"/>
-          </a:xfrm>
-          <a:prstGeom prst="rect">
-            <a:avLst/>
-          </a:prstGeom>
-          <a:solidFill>
-            <a:schemeClr val="accent1"/>
-          </a:solidFill>
-          <a:ln>
-            <a:noFill/>
-          </a:ln>
-        </p:spPr>
-        <p:txBody>
-          <a:bodyPr spcFirstLastPara="1" wrap="square" lIns="91425" tIns="91425" rIns="91425" bIns="91425" anchor="ctr" anchorCtr="0">
-            <a:noAutofit/>
-          </a:bodyPr>
-          <a:lstStyle/>
-          <a:p>
-            <a:pPr marL="0" lvl="0" indent="0" algn="l" rtl="0">
-              <a:spcBef>
-                <a:spcPts val="0"/>
-              </a:spcBef>
-              <a:spcAft>
-                <a:spcPts val="0"/>
-              </a:spcAft>
-              <a:buNone/>
-            </a:pPr>
-            <a:endParaRPr/>
-          </a:p>
-        </p:txBody>
-      </p:sp>
-      <p:sp>
-        <p:nvSpPr>
-          <p:cNvPr id="332" name="Google Shape;332;p34"/>
-          <p:cNvSpPr txBox="1">
-            <a:spLocks noGrp="1"/>
-          </p:cNvSpPr>
-          <p:nvPr>
-            <p:ph type="title"/>
-          </p:nvPr>
-        </p:nvSpPr>
-        <p:spPr>
-          <a:xfrm>
-            <a:off x="2374800" y="2517700"/>
-            <a:ext cx="4394400" cy="841800"/>
-          </a:xfrm>
-          <a:prstGeom prst="rect">
-            <a:avLst/>
-          </a:prstGeom>
-        </p:spPr>
-        <p:txBody>
-          <a:bodyPr spcFirstLastPara="1" wrap="square" lIns="91425" tIns="91425" rIns="91425" bIns="91425" anchor="ctr" anchorCtr="0">
-            <a:noAutofit/>
-          </a:bodyPr>
-          <a:lstStyle/>
-          <a:p>
-            <a:pPr marL="0" lvl="0" indent="0" algn="ctr" rtl="0">
-              <a:spcBef>
-                <a:spcPts val="0"/>
-              </a:spcBef>
-              <a:spcAft>
-                <a:spcPts val="0"/>
-              </a:spcAft>
-              <a:buNone/>
-            </a:pPr>
-            <a:r>
-              <a:rPr lang="en" sz="3200" dirty="0"/>
-              <a:t>GOAL &amp; PROBLEM STATEMENT</a:t>
-            </a:r>
-            <a:endParaRPr sz="3200" dirty="0"/>
-          </a:p>
-        </p:txBody>
-      </p:sp>
-      <p:sp>
-        <p:nvSpPr>
-          <p:cNvPr id="333" name="Google Shape;333;p34"/>
-          <p:cNvSpPr txBox="1">
-            <a:spLocks noGrp="1"/>
-          </p:cNvSpPr>
-          <p:nvPr>
-            <p:ph type="title" idx="2"/>
-          </p:nvPr>
-        </p:nvSpPr>
-        <p:spPr>
-          <a:xfrm>
-            <a:off x="2374800" y="1340150"/>
-            <a:ext cx="4394400" cy="1310100"/>
-          </a:xfrm>
-          <a:prstGeom prst="rect">
-            <a:avLst/>
-          </a:prstGeom>
-        </p:spPr>
-        <p:txBody>
-          <a:bodyPr spcFirstLastPara="1" wrap="square" lIns="91425" tIns="91425" rIns="91425" bIns="91425" anchor="ctr" anchorCtr="0">
-            <a:noAutofit/>
-          </a:bodyPr>
-          <a:lstStyle/>
-          <a:p>
-            <a:pPr marL="0" lvl="0" indent="0" algn="ctr" rtl="0">
-              <a:spcBef>
-                <a:spcPts val="0"/>
-              </a:spcBef>
-              <a:spcAft>
-                <a:spcPts val="0"/>
-              </a:spcAft>
-              <a:buNone/>
-            </a:pPr>
-            <a:r>
-              <a:rPr lang="en" dirty="0"/>
-              <a:t>01</a:t>
-            </a:r>
-            <a:endParaRPr dirty="0"/>
-          </a:p>
-        </p:txBody>
-      </p:sp>
-      <p:sp>
-        <p:nvSpPr>
-          <p:cNvPr id="334" name="Google Shape;334;p34"/>
-          <p:cNvSpPr txBox="1">
-            <a:spLocks noGrp="1"/>
-          </p:cNvSpPr>
-          <p:nvPr>
-            <p:ph type="subTitle" idx="1"/>
-          </p:nvPr>
-        </p:nvSpPr>
-        <p:spPr>
-          <a:xfrm>
-            <a:off x="2374800" y="3408475"/>
-            <a:ext cx="4394400" cy="442800"/>
-          </a:xfrm>
-          <a:prstGeom prst="rect">
-            <a:avLst/>
-          </a:prstGeom>
-        </p:spPr>
-        <p:txBody>
-          <a:bodyPr spcFirstLastPara="1" wrap="square" lIns="91425" tIns="91425" rIns="91425" bIns="91425" anchor="t" anchorCtr="0">
-            <a:noAutofit/>
-          </a:bodyPr>
-          <a:lstStyle/>
-          <a:p>
-            <a:pPr marL="0" lvl="0" indent="0" algn="ctr" rtl="0">
-              <a:spcBef>
-                <a:spcPts val="0"/>
-              </a:spcBef>
-              <a:spcAft>
-                <a:spcPts val="0"/>
-              </a:spcAft>
-              <a:buNone/>
-            </a:pPr>
-            <a:r>
-              <a:rPr lang="en" dirty="0"/>
-              <a:t>What to achieve for this project</a:t>
-            </a:r>
-            <a:endParaRPr dirty="0"/>
-          </a:p>
-        </p:txBody>
-      </p:sp>
-      <p:grpSp>
-        <p:nvGrpSpPr>
-          <p:cNvPr id="335" name="Google Shape;335;p34"/>
-          <p:cNvGrpSpPr/>
-          <p:nvPr/>
-        </p:nvGrpSpPr>
-        <p:grpSpPr>
-          <a:xfrm rot="-2026318">
-            <a:off x="6264543" y="-8947"/>
-            <a:ext cx="2674335" cy="2862666"/>
-            <a:chOff x="6201089" y="32925"/>
-            <a:chExt cx="699625" cy="748894"/>
-          </a:xfrm>
-        </p:grpSpPr>
-        <p:sp>
-          <p:nvSpPr>
-            <p:cNvPr id="336" name="Google Shape;336;p34"/>
-            <p:cNvSpPr/>
-            <p:nvPr/>
-          </p:nvSpPr>
-          <p:spPr>
-            <a:xfrm>
-              <a:off x="6201089" y="32925"/>
-              <a:ext cx="699625" cy="748894"/>
-            </a:xfrm>
-            <a:custGeom>
-              <a:avLst/>
-              <a:gdLst/>
-              <a:ahLst/>
-              <a:cxnLst/>
-              <a:rect l="l" t="t" r="r" b="b"/>
-              <a:pathLst>
-                <a:path w="19156" h="20505" extrusionOk="0">
-                  <a:moveTo>
-                    <a:pt x="5667" y="0"/>
-                  </a:moveTo>
-                  <a:lnTo>
-                    <a:pt x="0" y="15796"/>
-                  </a:lnTo>
-                  <a:lnTo>
-                    <a:pt x="12950" y="20463"/>
-                  </a:lnTo>
-                  <a:cubicBezTo>
-                    <a:pt x="13029" y="20491"/>
-                    <a:pt x="13108" y="20505"/>
-                    <a:pt x="13185" y="20505"/>
-                  </a:cubicBezTo>
-                  <a:cubicBezTo>
-                    <a:pt x="13456" y="20505"/>
-                    <a:pt x="13696" y="20338"/>
-                    <a:pt x="13796" y="20078"/>
-                  </a:cubicBezTo>
-                  <a:lnTo>
-                    <a:pt x="19053" y="5539"/>
-                  </a:lnTo>
-                  <a:cubicBezTo>
-                    <a:pt x="19155" y="5180"/>
-                    <a:pt x="18976" y="4795"/>
-                    <a:pt x="18642" y="4693"/>
-                  </a:cubicBezTo>
-                  <a:lnTo>
-                    <a:pt x="5667" y="0"/>
-                  </a:lnTo>
-                  <a:close/>
-                </a:path>
-              </a:pathLst>
-            </a:custGeom>
-            <a:solidFill>
-              <a:schemeClr val="dk2"/>
-            </a:solidFill>
-            <a:ln>
-              <a:noFill/>
-            </a:ln>
-          </p:spPr>
-          <p:txBody>
-            <a:bodyPr spcFirstLastPara="1" wrap="square" lIns="91425" tIns="91425" rIns="91425" bIns="91425" anchor="ctr" anchorCtr="0">
-              <a:noAutofit/>
-            </a:bodyPr>
-            <a:lstStyle/>
-            <a:p>
-              <a:pPr marL="0" lvl="0" indent="0" algn="l" rtl="0">
-                <a:spcBef>
-                  <a:spcPts val="0"/>
-                </a:spcBef>
-                <a:spcAft>
-                  <a:spcPts val="0"/>
-                </a:spcAft>
-                <a:buNone/>
-              </a:pPr>
-              <a:endParaRPr/>
-            </a:p>
-          </p:txBody>
-        </p:sp>
-        <p:sp>
-          <p:nvSpPr>
-            <p:cNvPr id="337" name="Google Shape;337;p34"/>
-            <p:cNvSpPr/>
-            <p:nvPr/>
-          </p:nvSpPr>
-          <p:spPr>
-            <a:xfrm>
-              <a:off x="6301309" y="69448"/>
-              <a:ext cx="221984" cy="581621"/>
-            </a:xfrm>
-            <a:custGeom>
-              <a:avLst/>
-              <a:gdLst/>
-              <a:ahLst/>
-              <a:cxnLst/>
-              <a:rect l="l" t="t" r="r" b="b"/>
-              <a:pathLst>
-                <a:path w="6078" h="15925" extrusionOk="0">
-                  <a:moveTo>
-                    <a:pt x="5693" y="0"/>
-                  </a:moveTo>
-                  <a:lnTo>
-                    <a:pt x="0" y="15796"/>
-                  </a:lnTo>
-                  <a:lnTo>
-                    <a:pt x="385" y="15924"/>
-                  </a:lnTo>
-                  <a:lnTo>
-                    <a:pt x="6077" y="129"/>
-                  </a:lnTo>
-                  <a:lnTo>
-                    <a:pt x="5693" y="0"/>
-                  </a:lnTo>
-                  <a:close/>
-                </a:path>
-              </a:pathLst>
-            </a:custGeom>
-            <a:solidFill>
-              <a:schemeClr val="dk1"/>
-            </a:solidFill>
-            <a:ln>
-              <a:noFill/>
-            </a:ln>
-          </p:spPr>
-          <p:txBody>
-            <a:bodyPr spcFirstLastPara="1" wrap="square" lIns="91425" tIns="91425" rIns="91425" bIns="91425" anchor="ctr" anchorCtr="0">
-              <a:noAutofit/>
-            </a:bodyPr>
-            <a:lstStyle/>
-            <a:p>
-              <a:pPr marL="0" lvl="0" indent="0" algn="l" rtl="0">
-                <a:spcBef>
-                  <a:spcPts val="0"/>
-                </a:spcBef>
-                <a:spcAft>
-                  <a:spcPts val="0"/>
-                </a:spcAft>
-                <a:buNone/>
-              </a:pPr>
-              <a:endParaRPr/>
-            </a:p>
-          </p:txBody>
-        </p:sp>
-        <p:sp>
-          <p:nvSpPr>
-            <p:cNvPr id="338" name="Google Shape;338;p34"/>
-            <p:cNvSpPr/>
-            <p:nvPr/>
-          </p:nvSpPr>
-          <p:spPr>
-            <a:xfrm>
-              <a:off x="6467052" y="311088"/>
-              <a:ext cx="293166" cy="199486"/>
-            </a:xfrm>
-            <a:custGeom>
-              <a:avLst/>
-              <a:gdLst/>
-              <a:ahLst/>
-              <a:cxnLst/>
-              <a:rect l="l" t="t" r="r" b="b"/>
-              <a:pathLst>
-                <a:path w="8027" h="5462" extrusionOk="0">
-                  <a:moveTo>
-                    <a:pt x="1052" y="0"/>
-                  </a:moveTo>
-                  <a:lnTo>
-                    <a:pt x="1" y="2949"/>
-                  </a:lnTo>
-                  <a:lnTo>
-                    <a:pt x="6975" y="5462"/>
-                  </a:lnTo>
-                  <a:lnTo>
-                    <a:pt x="8027" y="2513"/>
-                  </a:lnTo>
-                  <a:lnTo>
-                    <a:pt x="1052" y="0"/>
-                  </a:lnTo>
-                  <a:close/>
-                </a:path>
-              </a:pathLst>
-            </a:custGeom>
-            <a:solidFill>
-              <a:schemeClr val="lt1"/>
-            </a:solidFill>
-            <a:ln>
-              <a:noFill/>
-            </a:ln>
-          </p:spPr>
-          <p:txBody>
-            <a:bodyPr spcFirstLastPara="1" wrap="square" lIns="91425" tIns="91425" rIns="91425" bIns="91425" anchor="ctr" anchorCtr="0">
-              <a:noAutofit/>
-            </a:bodyPr>
-            <a:lstStyle/>
-            <a:p>
-              <a:pPr marL="0" lvl="0" indent="0" algn="l" rtl="0">
-                <a:spcBef>
-                  <a:spcPts val="0"/>
-                </a:spcBef>
-                <a:spcAft>
-                  <a:spcPts val="0"/>
-                </a:spcAft>
-                <a:buNone/>
-              </a:pPr>
-              <a:endParaRPr/>
-            </a:p>
-          </p:txBody>
-        </p:sp>
-        <p:sp>
-          <p:nvSpPr>
-            <p:cNvPr id="339" name="Google Shape;339;p34"/>
-            <p:cNvSpPr/>
-            <p:nvPr/>
-          </p:nvSpPr>
-          <p:spPr>
-            <a:xfrm>
-              <a:off x="6354670" y="100347"/>
-              <a:ext cx="91598" cy="91014"/>
-            </a:xfrm>
-            <a:custGeom>
-              <a:avLst/>
-              <a:gdLst/>
-              <a:ahLst/>
-              <a:cxnLst/>
-              <a:rect l="l" t="t" r="r" b="b"/>
-              <a:pathLst>
-                <a:path w="2508" h="2492" extrusionOk="0">
-                  <a:moveTo>
-                    <a:pt x="821" y="1"/>
-                  </a:moveTo>
-                  <a:lnTo>
-                    <a:pt x="693" y="334"/>
-                  </a:lnTo>
-                  <a:cubicBezTo>
-                    <a:pt x="796" y="334"/>
-                    <a:pt x="898" y="360"/>
-                    <a:pt x="1001" y="385"/>
-                  </a:cubicBezTo>
-                  <a:cubicBezTo>
-                    <a:pt x="2015" y="754"/>
-                    <a:pt x="1620" y="2160"/>
-                    <a:pt x="710" y="2160"/>
-                  </a:cubicBezTo>
-                  <a:cubicBezTo>
-                    <a:pt x="608" y="2160"/>
-                    <a:pt x="499" y="2142"/>
-                    <a:pt x="385" y="2103"/>
-                  </a:cubicBezTo>
-                  <a:cubicBezTo>
-                    <a:pt x="283" y="2052"/>
-                    <a:pt x="206" y="2001"/>
-                    <a:pt x="129" y="1949"/>
-                  </a:cubicBezTo>
-                  <a:lnTo>
-                    <a:pt x="1" y="2257"/>
-                  </a:lnTo>
-                  <a:cubicBezTo>
-                    <a:pt x="78" y="2308"/>
-                    <a:pt x="180" y="2360"/>
-                    <a:pt x="257" y="2411"/>
-                  </a:cubicBezTo>
-                  <a:cubicBezTo>
-                    <a:pt x="417" y="2466"/>
-                    <a:pt x="569" y="2491"/>
-                    <a:pt x="713" y="2491"/>
-                  </a:cubicBezTo>
-                  <a:cubicBezTo>
-                    <a:pt x="1969" y="2491"/>
-                    <a:pt x="2508" y="561"/>
-                    <a:pt x="1103" y="78"/>
-                  </a:cubicBezTo>
-                  <a:cubicBezTo>
-                    <a:pt x="1001" y="52"/>
-                    <a:pt x="924" y="26"/>
-                    <a:pt x="821" y="1"/>
-                  </a:cubicBezTo>
-                  <a:close/>
-                </a:path>
-              </a:pathLst>
-            </a:custGeom>
-            <a:solidFill>
-              <a:schemeClr val="accent1"/>
-            </a:solidFill>
-            <a:ln>
-              <a:noFill/>
-            </a:ln>
-          </p:spPr>
-          <p:txBody>
-            <a:bodyPr spcFirstLastPara="1" wrap="square" lIns="91425" tIns="91425" rIns="91425" bIns="91425" anchor="ctr" anchorCtr="0">
-              <a:noAutofit/>
-            </a:bodyPr>
-            <a:lstStyle/>
-            <a:p>
-              <a:pPr marL="0" lvl="0" indent="0" algn="l" rtl="0">
-                <a:spcBef>
-                  <a:spcPts val="0"/>
-                </a:spcBef>
-                <a:spcAft>
-                  <a:spcPts val="0"/>
-                </a:spcAft>
-                <a:buNone/>
-              </a:pPr>
-              <a:endParaRPr/>
-            </a:p>
-          </p:txBody>
-        </p:sp>
-        <p:sp>
-          <p:nvSpPr>
-            <p:cNvPr id="340" name="Google Shape;340;p34"/>
-            <p:cNvSpPr/>
-            <p:nvPr/>
-          </p:nvSpPr>
-          <p:spPr>
-            <a:xfrm>
-              <a:off x="6309709" y="225842"/>
-              <a:ext cx="91379" cy="90320"/>
-            </a:xfrm>
-            <a:custGeom>
-              <a:avLst/>
-              <a:gdLst/>
-              <a:ahLst/>
-              <a:cxnLst/>
-              <a:rect l="l" t="t" r="r" b="b"/>
-              <a:pathLst>
-                <a:path w="2502" h="2473" extrusionOk="0">
-                  <a:moveTo>
-                    <a:pt x="821" y="1"/>
-                  </a:moveTo>
-                  <a:lnTo>
-                    <a:pt x="693" y="308"/>
-                  </a:lnTo>
-                  <a:cubicBezTo>
-                    <a:pt x="796" y="308"/>
-                    <a:pt x="898" y="334"/>
-                    <a:pt x="1001" y="360"/>
-                  </a:cubicBezTo>
-                  <a:cubicBezTo>
-                    <a:pt x="2010" y="727"/>
-                    <a:pt x="1624" y="2141"/>
-                    <a:pt x="724" y="2141"/>
-                  </a:cubicBezTo>
-                  <a:cubicBezTo>
-                    <a:pt x="618" y="2141"/>
-                    <a:pt x="504" y="2121"/>
-                    <a:pt x="386" y="2078"/>
-                  </a:cubicBezTo>
-                  <a:cubicBezTo>
-                    <a:pt x="283" y="2026"/>
-                    <a:pt x="206" y="1975"/>
-                    <a:pt x="129" y="1924"/>
-                  </a:cubicBezTo>
-                  <a:lnTo>
-                    <a:pt x="1" y="2257"/>
-                  </a:lnTo>
-                  <a:cubicBezTo>
-                    <a:pt x="78" y="2309"/>
-                    <a:pt x="180" y="2334"/>
-                    <a:pt x="257" y="2385"/>
-                  </a:cubicBezTo>
-                  <a:cubicBezTo>
-                    <a:pt x="424" y="2446"/>
-                    <a:pt x="582" y="2473"/>
-                    <a:pt x="730" y="2473"/>
-                  </a:cubicBezTo>
-                  <a:cubicBezTo>
-                    <a:pt x="1974" y="2473"/>
-                    <a:pt x="2501" y="556"/>
-                    <a:pt x="1103" y="52"/>
-                  </a:cubicBezTo>
-                  <a:cubicBezTo>
-                    <a:pt x="1001" y="26"/>
-                    <a:pt x="924" y="1"/>
-                    <a:pt x="821" y="1"/>
-                  </a:cubicBezTo>
-                  <a:close/>
-                </a:path>
-              </a:pathLst>
-            </a:custGeom>
-            <a:solidFill>
-              <a:schemeClr val="accent1"/>
-            </a:solidFill>
-            <a:ln>
-              <a:noFill/>
-            </a:ln>
-          </p:spPr>
-          <p:txBody>
-            <a:bodyPr spcFirstLastPara="1" wrap="square" lIns="91425" tIns="91425" rIns="91425" bIns="91425" anchor="ctr" anchorCtr="0">
-              <a:noAutofit/>
-            </a:bodyPr>
-            <a:lstStyle/>
-            <a:p>
-              <a:pPr marL="0" lvl="0" indent="0" algn="l" rtl="0">
-                <a:spcBef>
-                  <a:spcPts val="0"/>
-                </a:spcBef>
-                <a:spcAft>
-                  <a:spcPts val="0"/>
-                </a:spcAft>
-                <a:buNone/>
-              </a:pPr>
-              <a:endParaRPr/>
-            </a:p>
-          </p:txBody>
-        </p:sp>
-        <p:sp>
-          <p:nvSpPr>
-            <p:cNvPr id="341" name="Google Shape;341;p34"/>
-            <p:cNvSpPr/>
-            <p:nvPr/>
-          </p:nvSpPr>
-          <p:spPr>
-            <a:xfrm>
-              <a:off x="6264786" y="350423"/>
-              <a:ext cx="91343" cy="90320"/>
-            </a:xfrm>
-            <a:custGeom>
-              <a:avLst/>
-              <a:gdLst/>
-              <a:ahLst/>
-              <a:cxnLst/>
-              <a:rect l="l" t="t" r="r" b="b"/>
-              <a:pathLst>
-                <a:path w="2501" h="2473" extrusionOk="0">
-                  <a:moveTo>
-                    <a:pt x="821" y="0"/>
-                  </a:moveTo>
-                  <a:lnTo>
-                    <a:pt x="692" y="333"/>
-                  </a:lnTo>
-                  <a:cubicBezTo>
-                    <a:pt x="795" y="333"/>
-                    <a:pt x="898" y="333"/>
-                    <a:pt x="1000" y="385"/>
-                  </a:cubicBezTo>
-                  <a:cubicBezTo>
-                    <a:pt x="2009" y="729"/>
-                    <a:pt x="1623" y="2140"/>
-                    <a:pt x="723" y="2140"/>
-                  </a:cubicBezTo>
-                  <a:cubicBezTo>
-                    <a:pt x="617" y="2140"/>
-                    <a:pt x="504" y="2120"/>
-                    <a:pt x="385" y="2077"/>
-                  </a:cubicBezTo>
-                  <a:cubicBezTo>
-                    <a:pt x="282" y="2052"/>
-                    <a:pt x="205" y="2000"/>
-                    <a:pt x="128" y="1923"/>
-                  </a:cubicBezTo>
-                  <a:lnTo>
-                    <a:pt x="0" y="2257"/>
-                  </a:lnTo>
-                  <a:cubicBezTo>
-                    <a:pt x="77" y="2308"/>
-                    <a:pt x="180" y="2359"/>
-                    <a:pt x="256" y="2385"/>
-                  </a:cubicBezTo>
-                  <a:cubicBezTo>
-                    <a:pt x="423" y="2445"/>
-                    <a:pt x="581" y="2472"/>
-                    <a:pt x="730" y="2472"/>
-                  </a:cubicBezTo>
-                  <a:cubicBezTo>
-                    <a:pt x="1974" y="2472"/>
-                    <a:pt x="2500" y="555"/>
-                    <a:pt x="1103" y="51"/>
-                  </a:cubicBezTo>
-                  <a:cubicBezTo>
-                    <a:pt x="1000" y="26"/>
-                    <a:pt x="923" y="0"/>
-                    <a:pt x="821" y="0"/>
-                  </a:cubicBezTo>
-                  <a:close/>
-                </a:path>
-              </a:pathLst>
-            </a:custGeom>
-            <a:solidFill>
-              <a:schemeClr val="accent1"/>
-            </a:solidFill>
-            <a:ln>
-              <a:noFill/>
-            </a:ln>
-          </p:spPr>
-          <p:txBody>
-            <a:bodyPr spcFirstLastPara="1" wrap="square" lIns="91425" tIns="91425" rIns="91425" bIns="91425" anchor="ctr" anchorCtr="0">
-              <a:noAutofit/>
-            </a:bodyPr>
-            <a:lstStyle/>
-            <a:p>
-              <a:pPr marL="0" lvl="0" indent="0" algn="l" rtl="0">
-                <a:spcBef>
-                  <a:spcPts val="0"/>
-                </a:spcBef>
-                <a:spcAft>
-                  <a:spcPts val="0"/>
-                </a:spcAft>
-                <a:buNone/>
-              </a:pPr>
-              <a:endParaRPr/>
-            </a:p>
-          </p:txBody>
-        </p:sp>
-        <p:sp>
-          <p:nvSpPr>
-            <p:cNvPr id="342" name="Google Shape;342;p34"/>
-            <p:cNvSpPr/>
-            <p:nvPr/>
-          </p:nvSpPr>
-          <p:spPr>
-            <a:xfrm>
-              <a:off x="6219825" y="474969"/>
-              <a:ext cx="91343" cy="90320"/>
-            </a:xfrm>
-            <a:custGeom>
-              <a:avLst/>
-              <a:gdLst/>
-              <a:ahLst/>
-              <a:cxnLst/>
-              <a:rect l="l" t="t" r="r" b="b"/>
-              <a:pathLst>
-                <a:path w="2501" h="2473" extrusionOk="0">
-                  <a:moveTo>
-                    <a:pt x="821" y="1"/>
-                  </a:moveTo>
-                  <a:lnTo>
-                    <a:pt x="693" y="334"/>
-                  </a:lnTo>
-                  <a:cubicBezTo>
-                    <a:pt x="795" y="334"/>
-                    <a:pt x="898" y="334"/>
-                    <a:pt x="1000" y="385"/>
-                  </a:cubicBezTo>
-                  <a:cubicBezTo>
-                    <a:pt x="2008" y="752"/>
-                    <a:pt x="1625" y="2141"/>
-                    <a:pt x="727" y="2141"/>
-                  </a:cubicBezTo>
-                  <a:cubicBezTo>
-                    <a:pt x="620" y="2141"/>
-                    <a:pt x="505" y="2121"/>
-                    <a:pt x="385" y="2078"/>
-                  </a:cubicBezTo>
-                  <a:cubicBezTo>
-                    <a:pt x="282" y="2052"/>
-                    <a:pt x="205" y="2001"/>
-                    <a:pt x="128" y="1949"/>
-                  </a:cubicBezTo>
-                  <a:lnTo>
-                    <a:pt x="0" y="2257"/>
-                  </a:lnTo>
-                  <a:cubicBezTo>
-                    <a:pt x="77" y="2308"/>
-                    <a:pt x="180" y="2360"/>
-                    <a:pt x="257" y="2385"/>
-                  </a:cubicBezTo>
-                  <a:cubicBezTo>
-                    <a:pt x="423" y="2445"/>
-                    <a:pt x="582" y="2473"/>
-                    <a:pt x="730" y="2473"/>
-                  </a:cubicBezTo>
-                  <a:cubicBezTo>
-                    <a:pt x="1974" y="2473"/>
-                    <a:pt x="2500" y="556"/>
-                    <a:pt x="1103" y="52"/>
-                  </a:cubicBezTo>
-                  <a:lnTo>
-                    <a:pt x="1103" y="52"/>
-                  </a:lnTo>
-                  <a:lnTo>
-                    <a:pt x="1103" y="78"/>
-                  </a:lnTo>
-                  <a:cubicBezTo>
-                    <a:pt x="1000" y="26"/>
-                    <a:pt x="923" y="26"/>
-                    <a:pt x="821" y="1"/>
-                  </a:cubicBezTo>
-                  <a:close/>
-                </a:path>
-              </a:pathLst>
-            </a:custGeom>
-            <a:solidFill>
-              <a:schemeClr val="accent1"/>
-            </a:solidFill>
-            <a:ln>
-              <a:noFill/>
-            </a:ln>
-          </p:spPr>
-          <p:txBody>
-            <a:bodyPr spcFirstLastPara="1" wrap="square" lIns="91425" tIns="91425" rIns="91425" bIns="91425" anchor="ctr" anchorCtr="0">
-              <a:noAutofit/>
-            </a:bodyPr>
-            <a:lstStyle/>
-            <a:p>
-              <a:pPr marL="0" lvl="0" indent="0" algn="l" rtl="0">
-                <a:spcBef>
-                  <a:spcPts val="0"/>
-                </a:spcBef>
-                <a:spcAft>
-                  <a:spcPts val="0"/>
-                </a:spcAft>
-                <a:buNone/>
-              </a:pPr>
-              <a:endParaRPr/>
-            </a:p>
-          </p:txBody>
-        </p:sp>
-        <p:sp>
-          <p:nvSpPr>
-            <p:cNvPr id="343" name="Google Shape;343;p34"/>
-            <p:cNvSpPr/>
-            <p:nvPr/>
-          </p:nvSpPr>
-          <p:spPr>
-            <a:xfrm>
-              <a:off x="6363107" y="137820"/>
-              <a:ext cx="19686" cy="7524"/>
-            </a:xfrm>
-            <a:custGeom>
-              <a:avLst/>
-              <a:gdLst/>
-              <a:ahLst/>
-              <a:cxnLst/>
-              <a:rect l="l" t="t" r="r" b="b"/>
-              <a:pathLst>
-                <a:path w="539" h="206" fill="none" extrusionOk="0">
-                  <a:moveTo>
-                    <a:pt x="0" y="0"/>
-                  </a:moveTo>
-                  <a:lnTo>
-                    <a:pt x="539" y="205"/>
-                  </a:lnTo>
-                </a:path>
-              </a:pathLst>
-            </a:custGeom>
-            <a:noFill/>
-            <a:ln w="9625" cap="rnd" cmpd="sng">
-              <a:solidFill>
-                <a:schemeClr val="lt1"/>
-              </a:solidFill>
-              <a:prstDash val="solid"/>
-              <a:miter lim="25642"/>
-              <a:headEnd type="none" w="sm" len="sm"/>
-              <a:tailEnd type="none" w="sm" len="sm"/>
-            </a:ln>
-          </p:spPr>
-          <p:txBody>
-            <a:bodyPr spcFirstLastPara="1" wrap="square" lIns="91425" tIns="91425" rIns="91425" bIns="91425" anchor="ctr" anchorCtr="0">
-              <a:noAutofit/>
-            </a:bodyPr>
-            <a:lstStyle/>
-            <a:p>
-              <a:pPr marL="0" lvl="0" indent="0" algn="l" rtl="0">
-                <a:spcBef>
-                  <a:spcPts val="0"/>
-                </a:spcBef>
-                <a:spcAft>
-                  <a:spcPts val="0"/>
-                </a:spcAft>
-                <a:buNone/>
-              </a:pPr>
-              <a:endParaRPr/>
-            </a:p>
-          </p:txBody>
-        </p:sp>
-        <p:sp>
-          <p:nvSpPr>
-            <p:cNvPr id="344" name="Google Shape;344;p34"/>
-            <p:cNvSpPr/>
-            <p:nvPr/>
-          </p:nvSpPr>
-          <p:spPr>
-            <a:xfrm>
-              <a:off x="6318146" y="264265"/>
-              <a:ext cx="18773" cy="6574"/>
-            </a:xfrm>
-            <a:custGeom>
-              <a:avLst/>
-              <a:gdLst/>
-              <a:ahLst/>
-              <a:cxnLst/>
-              <a:rect l="l" t="t" r="r" b="b"/>
-              <a:pathLst>
-                <a:path w="514" h="180" fill="none" extrusionOk="0">
-                  <a:moveTo>
-                    <a:pt x="1" y="0"/>
-                  </a:moveTo>
-                  <a:lnTo>
-                    <a:pt x="513" y="180"/>
-                  </a:lnTo>
-                </a:path>
-              </a:pathLst>
-            </a:custGeom>
-            <a:noFill/>
-            <a:ln w="9625" cap="rnd" cmpd="sng">
-              <a:solidFill>
-                <a:schemeClr val="lt1"/>
-              </a:solidFill>
-              <a:prstDash val="solid"/>
-              <a:miter lim="25642"/>
-              <a:headEnd type="none" w="sm" len="sm"/>
-              <a:tailEnd type="none" w="sm" len="sm"/>
-            </a:ln>
-          </p:spPr>
-          <p:txBody>
-            <a:bodyPr spcFirstLastPara="1" wrap="square" lIns="91425" tIns="91425" rIns="91425" bIns="91425" anchor="ctr" anchorCtr="0">
-              <a:noAutofit/>
-            </a:bodyPr>
-            <a:lstStyle/>
-            <a:p>
-              <a:pPr marL="0" lvl="0" indent="0" algn="l" rtl="0">
-                <a:spcBef>
-                  <a:spcPts val="0"/>
-                </a:spcBef>
-                <a:spcAft>
-                  <a:spcPts val="0"/>
-                </a:spcAft>
-                <a:buNone/>
-              </a:pPr>
-              <a:endParaRPr/>
-            </a:p>
-          </p:txBody>
-        </p:sp>
-        <p:sp>
-          <p:nvSpPr>
-            <p:cNvPr id="345" name="Google Shape;345;p34"/>
-            <p:cNvSpPr/>
-            <p:nvPr/>
-          </p:nvSpPr>
-          <p:spPr>
-            <a:xfrm>
-              <a:off x="6272273" y="389759"/>
-              <a:ext cx="19686" cy="7524"/>
-            </a:xfrm>
-            <a:custGeom>
-              <a:avLst/>
-              <a:gdLst/>
-              <a:ahLst/>
-              <a:cxnLst/>
-              <a:rect l="l" t="t" r="r" b="b"/>
-              <a:pathLst>
-                <a:path w="539" h="206" fill="none" extrusionOk="0">
-                  <a:moveTo>
-                    <a:pt x="0" y="0"/>
-                  </a:moveTo>
-                  <a:lnTo>
-                    <a:pt x="539" y="205"/>
-                  </a:lnTo>
-                </a:path>
-              </a:pathLst>
-            </a:custGeom>
-            <a:noFill/>
-            <a:ln w="9625" cap="rnd" cmpd="sng">
-              <a:solidFill>
-                <a:schemeClr val="lt1"/>
-              </a:solidFill>
-              <a:prstDash val="solid"/>
-              <a:miter lim="25642"/>
-              <a:headEnd type="none" w="sm" len="sm"/>
-              <a:tailEnd type="none" w="sm" len="sm"/>
-            </a:ln>
-          </p:spPr>
-          <p:txBody>
-            <a:bodyPr spcFirstLastPara="1" wrap="square" lIns="91425" tIns="91425" rIns="91425" bIns="91425" anchor="ctr" anchorCtr="0">
-              <a:noAutofit/>
-            </a:bodyPr>
-            <a:lstStyle/>
-            <a:p>
-              <a:pPr marL="0" lvl="0" indent="0" algn="l" rtl="0">
-                <a:spcBef>
-                  <a:spcPts val="0"/>
-                </a:spcBef>
-                <a:spcAft>
-                  <a:spcPts val="0"/>
-                </a:spcAft>
-                <a:buNone/>
-              </a:pPr>
-              <a:endParaRPr/>
-            </a:p>
-          </p:txBody>
-        </p:sp>
-        <p:sp>
-          <p:nvSpPr>
-            <p:cNvPr id="346" name="Google Shape;346;p34"/>
-            <p:cNvSpPr/>
-            <p:nvPr/>
-          </p:nvSpPr>
-          <p:spPr>
-            <a:xfrm>
-              <a:off x="6227313" y="516167"/>
-              <a:ext cx="18773" cy="6611"/>
-            </a:xfrm>
-            <a:custGeom>
-              <a:avLst/>
-              <a:gdLst/>
-              <a:ahLst/>
-              <a:cxnLst/>
-              <a:rect l="l" t="t" r="r" b="b"/>
-              <a:pathLst>
-                <a:path w="514" h="181" fill="none" extrusionOk="0">
-                  <a:moveTo>
-                    <a:pt x="0" y="1"/>
-                  </a:moveTo>
-                  <a:lnTo>
-                    <a:pt x="513" y="180"/>
-                  </a:lnTo>
-                </a:path>
-              </a:pathLst>
-            </a:custGeom>
-            <a:noFill/>
-            <a:ln w="9625" cap="rnd" cmpd="sng">
-              <a:solidFill>
-                <a:schemeClr val="lt1"/>
-              </a:solidFill>
-              <a:prstDash val="solid"/>
-              <a:miter lim="25642"/>
-              <a:headEnd type="none" w="sm" len="sm"/>
-              <a:tailEnd type="none" w="sm" len="sm"/>
-            </a:ln>
-          </p:spPr>
-          <p:txBody>
-            <a:bodyPr spcFirstLastPara="1" wrap="square" lIns="91425" tIns="91425" rIns="91425" bIns="91425" anchor="ctr" anchorCtr="0">
-              <a:noAutofit/>
-            </a:bodyPr>
-            <a:lstStyle/>
-            <a:p>
-              <a:pPr marL="0" lvl="0" indent="0" algn="l" rtl="0">
-                <a:spcBef>
-                  <a:spcPts val="0"/>
-                </a:spcBef>
-                <a:spcAft>
-                  <a:spcPts val="0"/>
-                </a:spcAft>
-                <a:buNone/>
-              </a:pPr>
-              <a:endParaRPr/>
-            </a:p>
-          </p:txBody>
-        </p:sp>
-      </p:grpSp>
-    </p:spTree>
-  </p:cSld>
-  <p:clrMapOvr>
-    <a:masterClrMapping/>
-  </p:clrMapOvr>
-</p:sld>
-</file>
-
 <file path=ppt/slides/slide4.xml><?xml version="1.0" encoding="utf-8"?>
 <p:sld xmlns:a="http://schemas.openxmlformats.org/drawingml/2006/main" xmlns:r="http://schemas.openxmlformats.org/officeDocument/2006/relationships" xmlns:p="http://schemas.openxmlformats.org/presentationml/2006/main">
   <p:cSld>
@@ -33180,7 +33660,7 @@
             </a:pPr>
             <a:r>
               <a:rPr lang="en" dirty="0"/>
-              <a:t>42,660 rows of data </a:t>
+              <a:t>Initial: 42,660 rows of data, Final: </a:t>
             </a:r>
           </a:p>
           <a:p>
@@ -33220,7 +33700,7 @@
             </a:pPr>
             <a:r>
               <a:rPr lang="en" dirty="0"/>
-              <a:t>No duplicate or missing data</a:t>
+              <a:t>Has duplicated content and some URL has been taken down</a:t>
             </a:r>
           </a:p>
           <a:p>
@@ -33748,7 +34228,7 @@
             </a:pPr>
             <a:r>
               <a:rPr lang="en-SG" dirty="0"/>
-              <a:t>No duplicate data</a:t>
+              <a:t>Has some duplicate jobs listings</a:t>
             </a:r>
           </a:p>
           <a:p>

</xml_diff>

<commit_message>
update slides with boxplot
</commit_message>
<xml_diff>
--- a/Capstone_presentation_v1.0.pptx
+++ b/Capstone_presentation_v1.0.pptx
@@ -2451,11 +2451,7 @@
             </a:pPr>
             <a:r>
               <a:rPr lang="en-US" dirty="0"/>
-              <a:t>Change </a:t>
-            </a:r>
-            <a:r>
-              <a:rPr lang="en-US"/>
-              <a:t>to boxplot</a:t>
+              <a:t>Change to boxplot</a:t>
             </a:r>
             <a:endParaRPr dirty="0"/>
           </a:p>
@@ -24637,10 +24633,10 @@
       </p:grpSp>
       <p:pic>
         <p:nvPicPr>
-          <p:cNvPr id="3" name="Picture 2">
+          <p:cNvPr id="2" name="Picture 1">
             <a:extLst>
               <a:ext uri="{FF2B5EF4-FFF2-40B4-BE49-F238E27FC236}">
-                <a16:creationId xmlns:a16="http://schemas.microsoft.com/office/drawing/2014/main" id="{48D24C6E-69C7-8448-B01B-AA83E1FECF5D}"/>
+                <a16:creationId xmlns:a16="http://schemas.microsoft.com/office/drawing/2014/main" id="{D0B63199-F720-4E46-8731-2E8080FF3743}"/>
               </a:ext>
             </a:extLst>
           </p:cNvPr>
@@ -24657,8 +24653,8 @@
         </p:blipFill>
         <p:spPr>
           <a:xfrm>
-            <a:off x="789414" y="1477475"/>
-            <a:ext cx="4025900" cy="3314700"/>
+            <a:off x="1428750" y="1432560"/>
+            <a:ext cx="5693410" cy="1713774"/>
           </a:xfrm>
           <a:prstGeom prst="rect">
             <a:avLst/>
@@ -24667,10 +24663,10 @@
       </p:pic>
       <p:pic>
         <p:nvPicPr>
-          <p:cNvPr id="5" name="Picture 4">
+          <p:cNvPr id="4" name="Picture 3">
             <a:extLst>
               <a:ext uri="{FF2B5EF4-FFF2-40B4-BE49-F238E27FC236}">
-                <a16:creationId xmlns:a16="http://schemas.microsoft.com/office/drawing/2014/main" id="{9A35054D-D540-AB44-8AB9-76480ACE3E70}"/>
+                <a16:creationId xmlns:a16="http://schemas.microsoft.com/office/drawing/2014/main" id="{54B7367E-7A54-3543-B225-18E35C6E0A31}"/>
               </a:ext>
             </a:extLst>
           </p:cNvPr>
@@ -24687,8 +24683,8 @@
         </p:blipFill>
         <p:spPr>
           <a:xfrm>
-            <a:off x="4985618" y="1649269"/>
-            <a:ext cx="4013200" cy="2844800"/>
+            <a:off x="1428750" y="3278826"/>
+            <a:ext cx="6362700" cy="1765300"/>
           </a:xfrm>
           <a:prstGeom prst="rect">
             <a:avLst/>

</xml_diff>